<commit_message>
Reajuste nos arquivos da Modelagem de dados
</commit_message>
<xml_diff>
--- a/Projeto de Banco de Dados/Projeto Itegrado - analise de dados.pptx
+++ b/Projeto de Banco de Dados/Projeto Itegrado - analise de dados.pptx
@@ -5,7 +5,7 @@
     <p:sldMasterId id="2147483683" r:id="rId1"/>
   </p:sldMasterIdLst>
   <p:notesMasterIdLst>
-    <p:notesMasterId r:id="rId24"/>
+    <p:notesMasterId r:id="rId26"/>
   </p:notesMasterIdLst>
   <p:sldIdLst>
     <p:sldId id="256" r:id="rId2"/>
@@ -15,38 +15,40 @@
     <p:sldId id="260" r:id="rId6"/>
     <p:sldId id="304" r:id="rId7"/>
     <p:sldId id="305" r:id="rId8"/>
-    <p:sldId id="263" r:id="rId9"/>
-    <p:sldId id="311" r:id="rId10"/>
-    <p:sldId id="306" r:id="rId11"/>
-    <p:sldId id="307" r:id="rId12"/>
-    <p:sldId id="266" r:id="rId13"/>
-    <p:sldId id="310" r:id="rId14"/>
-    <p:sldId id="271" r:id="rId15"/>
-    <p:sldId id="312" r:id="rId16"/>
-    <p:sldId id="313" r:id="rId17"/>
-    <p:sldId id="314" r:id="rId18"/>
-    <p:sldId id="315" r:id="rId19"/>
-    <p:sldId id="316" r:id="rId20"/>
-    <p:sldId id="317" r:id="rId21"/>
-    <p:sldId id="285" r:id="rId22"/>
-    <p:sldId id="318" r:id="rId23"/>
+    <p:sldId id="319" r:id="rId9"/>
+    <p:sldId id="263" r:id="rId10"/>
+    <p:sldId id="311" r:id="rId11"/>
+    <p:sldId id="306" r:id="rId12"/>
+    <p:sldId id="307" r:id="rId13"/>
+    <p:sldId id="266" r:id="rId14"/>
+    <p:sldId id="310" r:id="rId15"/>
+    <p:sldId id="271" r:id="rId16"/>
+    <p:sldId id="312" r:id="rId17"/>
+    <p:sldId id="313" r:id="rId18"/>
+    <p:sldId id="314" r:id="rId19"/>
+    <p:sldId id="315" r:id="rId20"/>
+    <p:sldId id="320" r:id="rId21"/>
+    <p:sldId id="316" r:id="rId22"/>
+    <p:sldId id="317" r:id="rId23"/>
+    <p:sldId id="285" r:id="rId24"/>
+    <p:sldId id="318" r:id="rId25"/>
   </p:sldIdLst>
   <p:sldSz cx="9144000" cy="5143500" type="screen16x9"/>
   <p:notesSz cx="6858000" cy="9144000"/>
   <p:embeddedFontLst>
     <p:embeddedFont>
-      <p:font typeface="Red Hat Text Medium" charset="0"/>
-      <p:regular r:id="rId25"/>
-      <p:bold r:id="rId26"/>
-      <p:italic r:id="rId27"/>
-      <p:boldItalic r:id="rId28"/>
+      <p:font typeface="Red Hat Text" charset="0"/>
+      <p:regular r:id="rId27"/>
+      <p:bold r:id="rId28"/>
+      <p:italic r:id="rId29"/>
+      <p:boldItalic r:id="rId30"/>
     </p:embeddedFont>
     <p:embeddedFont>
-      <p:font typeface="Red Hat Text" charset="0"/>
-      <p:regular r:id="rId29"/>
-      <p:bold r:id="rId30"/>
-      <p:italic r:id="rId31"/>
-      <p:boldItalic r:id="rId32"/>
+      <p:font typeface="Red Hat Text Medium" charset="0"/>
+      <p:regular r:id="rId31"/>
+      <p:bold r:id="rId32"/>
+      <p:italic r:id="rId33"/>
+      <p:boldItalic r:id="rId34"/>
     </p:embeddedFont>
   </p:embeddedFontLst>
   <p:defaultTextStyle>
@@ -940,6 +942,110 @@
   <p:cSld>
     <p:spTree>
       <p:nvGrpSpPr>
+        <p:cNvPr id="1" name="Shape 529"/>
+        <p:cNvGrpSpPr/>
+        <p:nvPr/>
+      </p:nvGrpSpPr>
+      <p:grpSpPr>
+        <a:xfrm>
+          <a:off x="0" y="0"/>
+          <a:ext cx="0" cy="0"/>
+          <a:chOff x="0" y="0"/>
+          <a:chExt cx="0" cy="0"/>
+        </a:xfrm>
+      </p:grpSpPr>
+      <p:sp>
+        <p:nvSpPr>
+          <p:cNvPr id="530" name="Google Shape;530;g83be7599cd_0_5:notes"/>
+          <p:cNvSpPr>
+            <a:spLocks noGrp="1" noRot="1" noChangeAspect="1"/>
+          </p:cNvSpPr>
+          <p:nvPr>
+            <p:ph type="sldImg" idx="2"/>
+          </p:nvPr>
+        </p:nvSpPr>
+        <p:spPr>
+          <a:xfrm>
+            <a:off x="381000" y="685800"/>
+            <a:ext cx="6096000" cy="3429000"/>
+          </a:xfrm>
+          <a:custGeom>
+            <a:avLst/>
+            <a:gdLst/>
+            <a:ahLst/>
+            <a:cxnLst/>
+            <a:rect l="l" t="t" r="r" b="b"/>
+            <a:pathLst>
+              <a:path w="120000" h="120000" extrusionOk="0">
+                <a:moveTo>
+                  <a:pt x="0" y="0"/>
+                </a:moveTo>
+                <a:lnTo>
+                  <a:pt x="120000" y="0"/>
+                </a:lnTo>
+                <a:lnTo>
+                  <a:pt x="120000" y="120000"/>
+                </a:lnTo>
+                <a:lnTo>
+                  <a:pt x="0" y="120000"/>
+                </a:lnTo>
+                <a:close/>
+              </a:path>
+            </a:pathLst>
+          </a:custGeom>
+        </p:spPr>
+      </p:sp>
+      <p:sp>
+        <p:nvSpPr>
+          <p:cNvPr id="531" name="Google Shape;531;g83be7599cd_0_5:notes"/>
+          <p:cNvSpPr txBox="1">
+            <a:spLocks noGrp="1"/>
+          </p:cNvSpPr>
+          <p:nvPr>
+            <p:ph type="body" idx="1"/>
+          </p:nvPr>
+        </p:nvSpPr>
+        <p:spPr>
+          <a:xfrm>
+            <a:off x="685800" y="4343400"/>
+            <a:ext cx="5486400" cy="4114800"/>
+          </a:xfrm>
+          <a:prstGeom prst="rect">
+            <a:avLst/>
+          </a:prstGeom>
+        </p:spPr>
+        <p:txBody>
+          <a:bodyPr spcFirstLastPara="1" wrap="square" lIns="91425" tIns="91425" rIns="91425" bIns="91425" anchor="t" anchorCtr="0">
+            <a:noAutofit/>
+          </a:bodyPr>
+          <a:lstStyle/>
+          <a:p>
+            <a:pPr marL="0" lvl="0" indent="0" algn="l" rtl="0">
+              <a:spcBef>
+                <a:spcPts val="0"/>
+              </a:spcBef>
+              <a:spcAft>
+                <a:spcPts val="0"/>
+              </a:spcAft>
+              <a:buNone/>
+            </a:pPr>
+            <a:endParaRPr/>
+          </a:p>
+        </p:txBody>
+      </p:sp>
+    </p:spTree>
+  </p:cSld>
+  <p:clrMapOvr>
+    <a:masterClrMapping/>
+  </p:clrMapOvr>
+</p:notes>
+</file>
+
+<file path=ppt/notesSlides/notesSlide12.xml><?xml version="1.0" encoding="utf-8"?>
+<p:notes xmlns:a="http://schemas.openxmlformats.org/drawingml/2006/main" xmlns:r="http://schemas.openxmlformats.org/officeDocument/2006/relationships" xmlns:p="http://schemas.openxmlformats.org/presentationml/2006/main" showMasterSp="0" showMasterPhAnim="0">
+  <p:cSld>
+    <p:spTree>
+      <p:nvGrpSpPr>
         <p:cNvPr id="1" name="Shape 358"/>
         <p:cNvGrpSpPr/>
         <p:nvPr/>
@@ -996,110 +1102,6 @@
       <p:sp>
         <p:nvSpPr>
           <p:cNvPr id="360" name="Google Shape;360;g7205dce7e1_0_25:notes"/>
-          <p:cNvSpPr txBox="1">
-            <a:spLocks noGrp="1"/>
-          </p:cNvSpPr>
-          <p:nvPr>
-            <p:ph type="body" idx="1"/>
-          </p:nvPr>
-        </p:nvSpPr>
-        <p:spPr>
-          <a:xfrm>
-            <a:off x="685800" y="4343400"/>
-            <a:ext cx="5486400" cy="4114800"/>
-          </a:xfrm>
-          <a:prstGeom prst="rect">
-            <a:avLst/>
-          </a:prstGeom>
-        </p:spPr>
-        <p:txBody>
-          <a:bodyPr spcFirstLastPara="1" wrap="square" lIns="91425" tIns="91425" rIns="91425" bIns="91425" anchor="t" anchorCtr="0">
-            <a:noAutofit/>
-          </a:bodyPr>
-          <a:lstStyle/>
-          <a:p>
-            <a:pPr marL="0" lvl="0" indent="0" algn="l" rtl="0">
-              <a:spcBef>
-                <a:spcPts val="0"/>
-              </a:spcBef>
-              <a:spcAft>
-                <a:spcPts val="0"/>
-              </a:spcAft>
-              <a:buNone/>
-            </a:pPr>
-            <a:endParaRPr/>
-          </a:p>
-        </p:txBody>
-      </p:sp>
-    </p:spTree>
-  </p:cSld>
-  <p:clrMapOvr>
-    <a:masterClrMapping/>
-  </p:clrMapOvr>
-</p:notes>
-</file>
-
-<file path=ppt/notesSlides/notesSlide12.xml><?xml version="1.0" encoding="utf-8"?>
-<p:notes xmlns:a="http://schemas.openxmlformats.org/drawingml/2006/main" xmlns:r="http://schemas.openxmlformats.org/officeDocument/2006/relationships" xmlns:p="http://schemas.openxmlformats.org/presentationml/2006/main" showMasterSp="0" showMasterPhAnim="0">
-  <p:cSld>
-    <p:spTree>
-      <p:nvGrpSpPr>
-        <p:cNvPr id="1" name="Shape 661"/>
-        <p:cNvGrpSpPr/>
-        <p:nvPr/>
-      </p:nvGrpSpPr>
-      <p:grpSpPr>
-        <a:xfrm>
-          <a:off x="0" y="0"/>
-          <a:ext cx="0" cy="0"/>
-          <a:chOff x="0" y="0"/>
-          <a:chExt cx="0" cy="0"/>
-        </a:xfrm>
-      </p:grpSpPr>
-      <p:sp>
-        <p:nvSpPr>
-          <p:cNvPr id="662" name="Google Shape;662;g7504da04cf_0_563:notes"/>
-          <p:cNvSpPr>
-            <a:spLocks noGrp="1" noRot="1" noChangeAspect="1"/>
-          </p:cNvSpPr>
-          <p:nvPr>
-            <p:ph type="sldImg" idx="2"/>
-          </p:nvPr>
-        </p:nvSpPr>
-        <p:spPr>
-          <a:xfrm>
-            <a:off x="381000" y="685800"/>
-            <a:ext cx="6096000" cy="3429000"/>
-          </a:xfrm>
-          <a:custGeom>
-            <a:avLst/>
-            <a:gdLst/>
-            <a:ahLst/>
-            <a:cxnLst/>
-            <a:rect l="l" t="t" r="r" b="b"/>
-            <a:pathLst>
-              <a:path w="120000" h="120000" extrusionOk="0">
-                <a:moveTo>
-                  <a:pt x="0" y="0"/>
-                </a:moveTo>
-                <a:lnTo>
-                  <a:pt x="120000" y="0"/>
-                </a:lnTo>
-                <a:lnTo>
-                  <a:pt x="120000" y="120000"/>
-                </a:lnTo>
-                <a:lnTo>
-                  <a:pt x="0" y="120000"/>
-                </a:lnTo>
-                <a:close/>
-              </a:path>
-            </a:pathLst>
-          </a:custGeom>
-        </p:spPr>
-      </p:sp>
-      <p:sp>
-        <p:nvSpPr>
-          <p:cNvPr id="663" name="Google Shape;663;g7504da04cf_0_563:notes"/>
           <p:cNvSpPr txBox="1">
             <a:spLocks noGrp="1"/>
           </p:cNvSpPr>
@@ -1252,7 +1254,7 @@
   <p:cSld>
     <p:spTree>
       <p:nvGrpSpPr>
-        <p:cNvPr id="1" name="Shape 1141"/>
+        <p:cNvPr id="1" name="Shape 661"/>
         <p:cNvGrpSpPr/>
         <p:nvPr/>
       </p:nvGrpSpPr>
@@ -1266,7 +1268,7 @@
       </p:grpSpPr>
       <p:sp>
         <p:nvSpPr>
-          <p:cNvPr id="1142" name="Google Shape;1142;g83be7599cd_0_57:notes"/>
+          <p:cNvPr id="662" name="Google Shape;662;g7504da04cf_0_563:notes"/>
           <p:cNvSpPr>
             <a:spLocks noGrp="1" noRot="1" noChangeAspect="1"/>
           </p:cNvSpPr>
@@ -1307,7 +1309,7 @@
       </p:sp>
       <p:sp>
         <p:nvSpPr>
-          <p:cNvPr id="1143" name="Google Shape;1143;g83be7599cd_0_57:notes"/>
+          <p:cNvPr id="663" name="Google Shape;663;g7504da04cf_0_563:notes"/>
           <p:cNvSpPr txBox="1">
             <a:spLocks noGrp="1"/>
           </p:cNvSpPr>
@@ -2084,6 +2086,214 @@
   <p:cSld>
     <p:spTree>
       <p:nvGrpSpPr>
+        <p:cNvPr id="1" name="Shape 1141"/>
+        <p:cNvGrpSpPr/>
+        <p:nvPr/>
+      </p:nvGrpSpPr>
+      <p:grpSpPr>
+        <a:xfrm>
+          <a:off x="0" y="0"/>
+          <a:ext cx="0" cy="0"/>
+          <a:chOff x="0" y="0"/>
+          <a:chExt cx="0" cy="0"/>
+        </a:xfrm>
+      </p:grpSpPr>
+      <p:sp>
+        <p:nvSpPr>
+          <p:cNvPr id="1142" name="Google Shape;1142;g83be7599cd_0_57:notes"/>
+          <p:cNvSpPr>
+            <a:spLocks noGrp="1" noRot="1" noChangeAspect="1"/>
+          </p:cNvSpPr>
+          <p:nvPr>
+            <p:ph type="sldImg" idx="2"/>
+          </p:nvPr>
+        </p:nvSpPr>
+        <p:spPr>
+          <a:xfrm>
+            <a:off x="381000" y="685800"/>
+            <a:ext cx="6096000" cy="3429000"/>
+          </a:xfrm>
+          <a:custGeom>
+            <a:avLst/>
+            <a:gdLst/>
+            <a:ahLst/>
+            <a:cxnLst/>
+            <a:rect l="l" t="t" r="r" b="b"/>
+            <a:pathLst>
+              <a:path w="120000" h="120000" extrusionOk="0">
+                <a:moveTo>
+                  <a:pt x="0" y="0"/>
+                </a:moveTo>
+                <a:lnTo>
+                  <a:pt x="120000" y="0"/>
+                </a:lnTo>
+                <a:lnTo>
+                  <a:pt x="120000" y="120000"/>
+                </a:lnTo>
+                <a:lnTo>
+                  <a:pt x="0" y="120000"/>
+                </a:lnTo>
+                <a:close/>
+              </a:path>
+            </a:pathLst>
+          </a:custGeom>
+        </p:spPr>
+      </p:sp>
+      <p:sp>
+        <p:nvSpPr>
+          <p:cNvPr id="1143" name="Google Shape;1143;g83be7599cd_0_57:notes"/>
+          <p:cNvSpPr txBox="1">
+            <a:spLocks noGrp="1"/>
+          </p:cNvSpPr>
+          <p:nvPr>
+            <p:ph type="body" idx="1"/>
+          </p:nvPr>
+        </p:nvSpPr>
+        <p:spPr>
+          <a:xfrm>
+            <a:off x="685800" y="4343400"/>
+            <a:ext cx="5486400" cy="4114800"/>
+          </a:xfrm>
+          <a:prstGeom prst="rect">
+            <a:avLst/>
+          </a:prstGeom>
+        </p:spPr>
+        <p:txBody>
+          <a:bodyPr spcFirstLastPara="1" wrap="square" lIns="91425" tIns="91425" rIns="91425" bIns="91425" anchor="t" anchorCtr="0">
+            <a:noAutofit/>
+          </a:bodyPr>
+          <a:lstStyle/>
+          <a:p>
+            <a:pPr marL="0" lvl="0" indent="0" algn="l" rtl="0">
+              <a:spcBef>
+                <a:spcPts val="0"/>
+              </a:spcBef>
+              <a:spcAft>
+                <a:spcPts val="0"/>
+              </a:spcAft>
+              <a:buNone/>
+            </a:pPr>
+            <a:endParaRPr/>
+          </a:p>
+        </p:txBody>
+      </p:sp>
+    </p:spTree>
+  </p:cSld>
+  <p:clrMapOvr>
+    <a:masterClrMapping/>
+  </p:clrMapOvr>
+</p:notes>
+</file>
+
+<file path=ppt/notesSlides/notesSlide22.xml><?xml version="1.0" encoding="utf-8"?>
+<p:notes xmlns:a="http://schemas.openxmlformats.org/drawingml/2006/main" xmlns:r="http://schemas.openxmlformats.org/officeDocument/2006/relationships" xmlns:p="http://schemas.openxmlformats.org/presentationml/2006/main" showMasterSp="0" showMasterPhAnim="0">
+  <p:cSld>
+    <p:spTree>
+      <p:nvGrpSpPr>
+        <p:cNvPr id="1" name="Shape 1141"/>
+        <p:cNvGrpSpPr/>
+        <p:nvPr/>
+      </p:nvGrpSpPr>
+      <p:grpSpPr>
+        <a:xfrm>
+          <a:off x="0" y="0"/>
+          <a:ext cx="0" cy="0"/>
+          <a:chOff x="0" y="0"/>
+          <a:chExt cx="0" cy="0"/>
+        </a:xfrm>
+      </p:grpSpPr>
+      <p:sp>
+        <p:nvSpPr>
+          <p:cNvPr id="1142" name="Google Shape;1142;g83be7599cd_0_57:notes"/>
+          <p:cNvSpPr>
+            <a:spLocks noGrp="1" noRot="1" noChangeAspect="1"/>
+          </p:cNvSpPr>
+          <p:nvPr>
+            <p:ph type="sldImg" idx="2"/>
+          </p:nvPr>
+        </p:nvSpPr>
+        <p:spPr>
+          <a:xfrm>
+            <a:off x="381000" y="685800"/>
+            <a:ext cx="6096000" cy="3429000"/>
+          </a:xfrm>
+          <a:custGeom>
+            <a:avLst/>
+            <a:gdLst/>
+            <a:ahLst/>
+            <a:cxnLst/>
+            <a:rect l="l" t="t" r="r" b="b"/>
+            <a:pathLst>
+              <a:path w="120000" h="120000" extrusionOk="0">
+                <a:moveTo>
+                  <a:pt x="0" y="0"/>
+                </a:moveTo>
+                <a:lnTo>
+                  <a:pt x="120000" y="0"/>
+                </a:lnTo>
+                <a:lnTo>
+                  <a:pt x="120000" y="120000"/>
+                </a:lnTo>
+                <a:lnTo>
+                  <a:pt x="0" y="120000"/>
+                </a:lnTo>
+                <a:close/>
+              </a:path>
+            </a:pathLst>
+          </a:custGeom>
+        </p:spPr>
+      </p:sp>
+      <p:sp>
+        <p:nvSpPr>
+          <p:cNvPr id="1143" name="Google Shape;1143;g83be7599cd_0_57:notes"/>
+          <p:cNvSpPr txBox="1">
+            <a:spLocks noGrp="1"/>
+          </p:cNvSpPr>
+          <p:nvPr>
+            <p:ph type="body" idx="1"/>
+          </p:nvPr>
+        </p:nvSpPr>
+        <p:spPr>
+          <a:xfrm>
+            <a:off x="685800" y="4343400"/>
+            <a:ext cx="5486400" cy="4114800"/>
+          </a:xfrm>
+          <a:prstGeom prst="rect">
+            <a:avLst/>
+          </a:prstGeom>
+        </p:spPr>
+        <p:txBody>
+          <a:bodyPr spcFirstLastPara="1" wrap="square" lIns="91425" tIns="91425" rIns="91425" bIns="91425" anchor="t" anchorCtr="0">
+            <a:noAutofit/>
+          </a:bodyPr>
+          <a:lstStyle/>
+          <a:p>
+            <a:pPr marL="0" lvl="0" indent="0" algn="l" rtl="0">
+              <a:spcBef>
+                <a:spcPts val="0"/>
+              </a:spcBef>
+              <a:spcAft>
+                <a:spcPts val="0"/>
+              </a:spcAft>
+              <a:buNone/>
+            </a:pPr>
+            <a:endParaRPr/>
+          </a:p>
+        </p:txBody>
+      </p:sp>
+    </p:spTree>
+  </p:cSld>
+  <p:clrMapOvr>
+    <a:masterClrMapping/>
+  </p:clrMapOvr>
+</p:notes>
+</file>
+
+<file path=ppt/notesSlides/notesSlide23.xml><?xml version="1.0" encoding="utf-8"?>
+<p:notes xmlns:a="http://schemas.openxmlformats.org/drawingml/2006/main" xmlns:r="http://schemas.openxmlformats.org/officeDocument/2006/relationships" xmlns:p="http://schemas.openxmlformats.org/presentationml/2006/main" showMasterSp="0" showMasterPhAnim="0">
+  <p:cSld>
+    <p:spTree>
+      <p:nvGrpSpPr>
         <p:cNvPr id="1" name="Shape 2307"/>
         <p:cNvGrpSpPr/>
         <p:nvPr/>
@@ -2183,7 +2393,7 @@
 </p:notes>
 </file>
 
-<file path=ppt/notesSlides/notesSlide22.xml><?xml version="1.0" encoding="utf-8"?>
+<file path=ppt/notesSlides/notesSlide24.xml><?xml version="1.0" encoding="utf-8"?>
 <p:notes xmlns:a="http://schemas.openxmlformats.org/drawingml/2006/main" xmlns:r="http://schemas.openxmlformats.org/officeDocument/2006/relationships" xmlns:p="http://schemas.openxmlformats.org/presentationml/2006/main" showMasterSp="0" showMasterPhAnim="0">
   <p:cSld>
     <p:spTree>
@@ -22426,18 +22636,304 @@
           </a:extLst>
         </p:spPr>
       </p:pic>
+    </p:spTree>
+  </p:cSld>
+  <p:clrMapOvr>
+    <a:masterClrMapping/>
+  </p:clrMapOvr>
+  <p:timing>
+    <p:tnLst>
+      <p:par>
+        <p:cTn id="1" dur="indefinite" restart="never" nodeType="tmRoot"/>
+      </p:par>
+    </p:tnLst>
+  </p:timing>
+</p:sld>
+</file>
+
+<file path=ppt/slides/slide10.xml><?xml version="1.0" encoding="utf-8"?>
+<p:sld xmlns:a="http://schemas.openxmlformats.org/drawingml/2006/main" xmlns:r="http://schemas.openxmlformats.org/officeDocument/2006/relationships" xmlns:p="http://schemas.openxmlformats.org/presentationml/2006/main">
+  <p:cSld>
+    <p:bg>
+      <p:bgPr>
+        <a:gradFill>
+          <a:gsLst>
+            <a:gs pos="100000">
+              <a:schemeClr val="bg1"/>
+            </a:gs>
+            <a:gs pos="3000">
+              <a:schemeClr val="bg2"/>
+            </a:gs>
+            <a:gs pos="70000">
+              <a:schemeClr val="accent1">
+                <a:tint val="23500"/>
+                <a:satMod val="160000"/>
+              </a:schemeClr>
+            </a:gs>
+          </a:gsLst>
+          <a:lin ang="5400000" scaled="0"/>
+        </a:gradFill>
+        <a:effectLst/>
+      </p:bgPr>
+    </p:bg>
+    <p:spTree>
+      <p:nvGrpSpPr>
+        <p:cNvPr id="1" name="Shape 532"/>
+        <p:cNvGrpSpPr/>
+        <p:nvPr/>
+      </p:nvGrpSpPr>
+      <p:grpSpPr>
+        <a:xfrm>
+          <a:off x="0" y="0"/>
+          <a:ext cx="0" cy="0"/>
+          <a:chOff x="0" y="0"/>
+          <a:chExt cx="0" cy="0"/>
+        </a:xfrm>
+      </p:grpSpPr>
+      <p:sp>
+        <p:nvSpPr>
+          <p:cNvPr id="535" name="Google Shape;535;p45"/>
+          <p:cNvSpPr txBox="1">
+            <a:spLocks noGrp="1"/>
+          </p:cNvSpPr>
+          <p:nvPr>
+            <p:ph type="subTitle" idx="3"/>
+          </p:nvPr>
+        </p:nvSpPr>
+        <p:spPr>
+          <a:xfrm>
+            <a:off x="2123728" y="1483090"/>
+            <a:ext cx="4392488" cy="1010202"/>
+          </a:xfrm>
+          <a:prstGeom prst="rect">
+            <a:avLst/>
+          </a:prstGeom>
+        </p:spPr>
+        <p:txBody>
+          <a:bodyPr spcFirstLastPara="1" wrap="square" lIns="91425" tIns="91425" rIns="91425" bIns="91425" anchor="t" anchorCtr="0">
+            <a:noAutofit/>
+          </a:bodyPr>
+          <a:lstStyle/>
+          <a:p>
+            <a:pPr marL="0" lvl="0" indent="0">
+              <a:lnSpc>
+                <a:spcPct val="100000"/>
+              </a:lnSpc>
+            </a:pPr>
+            <a:r>
+              <a:rPr lang="pt-BR" b="1" i="1" dirty="0">
+                <a:solidFill>
+                  <a:schemeClr val="bg1"/>
+                </a:solidFill>
+              </a:rPr>
+              <a:t>Armazenamento dos números de telefone dos clientes: É importante armazenar os números de telefone dos clientes para que possam ser utilizados para fins de contato.</a:t>
+            </a:r>
+            <a:endParaRPr b="1" i="1" dirty="0">
+              <a:solidFill>
+                <a:schemeClr val="bg1"/>
+              </a:solidFill>
+            </a:endParaRPr>
+          </a:p>
+        </p:txBody>
+      </p:sp>
+      <p:sp>
+        <p:nvSpPr>
+          <p:cNvPr id="537" name="Google Shape;537;p45"/>
+          <p:cNvSpPr txBox="1">
+            <a:spLocks noGrp="1"/>
+          </p:cNvSpPr>
+          <p:nvPr>
+            <p:ph type="title"/>
+          </p:nvPr>
+        </p:nvSpPr>
+        <p:spPr>
+          <a:xfrm>
+            <a:off x="2339752" y="123478"/>
+            <a:ext cx="6624735" cy="647700"/>
+          </a:xfrm>
+          <a:prstGeom prst="rect">
+            <a:avLst/>
+          </a:prstGeom>
+        </p:spPr>
+        <p:txBody>
+          <a:bodyPr spcFirstLastPara="1" wrap="square" lIns="91425" tIns="91425" rIns="91425" bIns="91425" anchor="ctr" anchorCtr="0">
+            <a:noAutofit/>
+          </a:bodyPr>
+          <a:lstStyle/>
+          <a:p>
+            <a:pPr marL="0" lvl="0" indent="0" algn="r" rtl="0">
+              <a:spcBef>
+                <a:spcPts val="0"/>
+              </a:spcBef>
+              <a:spcAft>
+                <a:spcPts val="0"/>
+              </a:spcAft>
+              <a:buNone/>
+            </a:pPr>
+            <a:r>
+              <a:rPr lang="pt-BR" dirty="0" smtClean="0"/>
+              <a:t>Normalização da</a:t>
+            </a:r>
+            <a:r>
+              <a:rPr lang="pt-BR" dirty="0" smtClean="0">
+                <a:solidFill>
+                  <a:schemeClr val="dk2"/>
+                </a:solidFill>
+              </a:rPr>
+              <a:t> Entidade Telefone</a:t>
+            </a:r>
+            <a:endParaRPr dirty="0">
+              <a:solidFill>
+                <a:schemeClr val="dk2"/>
+              </a:solidFill>
+            </a:endParaRPr>
+          </a:p>
+        </p:txBody>
+      </p:sp>
+      <p:sp>
+        <p:nvSpPr>
+          <p:cNvPr id="540" name="Google Shape;540;p45"/>
+          <p:cNvSpPr txBox="1">
+            <a:spLocks noGrp="1"/>
+          </p:cNvSpPr>
+          <p:nvPr>
+            <p:ph type="subTitle" idx="7"/>
+          </p:nvPr>
+        </p:nvSpPr>
+        <p:spPr>
+          <a:xfrm>
+            <a:off x="489441" y="3147814"/>
+            <a:ext cx="1453200" cy="572700"/>
+          </a:xfrm>
+          <a:prstGeom prst="rect">
+            <a:avLst/>
+          </a:prstGeom>
+        </p:spPr>
+        <p:txBody>
+          <a:bodyPr spcFirstLastPara="1" wrap="square" lIns="91425" tIns="91425" rIns="91425" bIns="91425" anchor="t" anchorCtr="0">
+            <a:noAutofit/>
+          </a:bodyPr>
+          <a:lstStyle/>
+          <a:p>
+            <a:pPr marL="0" lvl="0" indent="0"/>
+            <a:r>
+              <a:rPr lang="pt-BR" dirty="0" smtClean="0">
+                <a:solidFill>
+                  <a:schemeClr val="bg2"/>
+                </a:solidFill>
+              </a:rPr>
+              <a:t>Telefones</a:t>
+            </a:r>
+            <a:endParaRPr dirty="0">
+              <a:solidFill>
+                <a:schemeClr val="bg2"/>
+              </a:solidFill>
+            </a:endParaRPr>
+          </a:p>
+        </p:txBody>
+      </p:sp>
+      <p:grpSp>
+        <p:nvGrpSpPr>
+          <p:cNvPr id="542" name="Google Shape;542;p45"/>
+          <p:cNvGrpSpPr/>
+          <p:nvPr/>
+        </p:nvGrpSpPr>
+        <p:grpSpPr>
+          <a:xfrm>
+            <a:off x="627229" y="1347614"/>
+            <a:ext cx="1179900" cy="1747986"/>
+            <a:chOff x="1367125" y="1476625"/>
+            <a:chExt cx="1179900" cy="1800200"/>
+          </a:xfrm>
+        </p:grpSpPr>
+        <p:sp>
+          <p:nvSpPr>
+            <p:cNvPr id="543" name="Google Shape;543;p45"/>
+            <p:cNvSpPr/>
+            <p:nvPr/>
+          </p:nvSpPr>
+          <p:spPr>
+            <a:xfrm>
+              <a:off x="1367125" y="1476625"/>
+              <a:ext cx="1179900" cy="1179900"/>
+            </a:xfrm>
+            <a:prstGeom prst="ellipse">
+              <a:avLst/>
+            </a:prstGeom>
+            <a:noFill/>
+            <a:ln w="38100" cap="flat" cmpd="sng">
+              <a:solidFill>
+                <a:schemeClr val="lt1"/>
+              </a:solidFill>
+              <a:prstDash val="solid"/>
+              <a:round/>
+              <a:headEnd type="none" w="sm" len="sm"/>
+              <a:tailEnd type="none" w="sm" len="sm"/>
+            </a:ln>
+          </p:spPr>
+          <p:txBody>
+            <a:bodyPr spcFirstLastPara="1" wrap="square" lIns="91425" tIns="91425" rIns="91425" bIns="91425" anchor="ctr" anchorCtr="0">
+              <a:noAutofit/>
+            </a:bodyPr>
+            <a:lstStyle/>
+            <a:p>
+              <a:pPr marL="0" lvl="0" indent="0" algn="l" rtl="0">
+                <a:spcBef>
+                  <a:spcPts val="0"/>
+                </a:spcBef>
+                <a:spcAft>
+                  <a:spcPts val="0"/>
+                </a:spcAft>
+                <a:buNone/>
+              </a:pPr>
+              <a:endParaRPr>
+                <a:solidFill>
+                  <a:schemeClr val="bg2"/>
+                </a:solidFill>
+              </a:endParaRPr>
+            </a:p>
+          </p:txBody>
+        </p:sp>
+        <p:cxnSp>
+          <p:nvCxnSpPr>
+            <p:cNvPr id="544" name="Google Shape;544;p45"/>
+            <p:cNvCxnSpPr>
+              <a:stCxn id="543" idx="4"/>
+              <a:endCxn id="540" idx="0"/>
+            </p:cNvCxnSpPr>
+            <p:nvPr/>
+          </p:nvCxnSpPr>
+          <p:spPr>
+            <a:xfrm flipH="1">
+              <a:off x="1955937" y="2656525"/>
+              <a:ext cx="1138" cy="620300"/>
+            </a:xfrm>
+            <a:prstGeom prst="straightConnector1">
+              <a:avLst/>
+            </a:prstGeom>
+            <a:noFill/>
+            <a:ln w="38100" cap="flat" cmpd="sng">
+              <a:solidFill>
+                <a:schemeClr val="lt1"/>
+              </a:solidFill>
+              <a:prstDash val="solid"/>
+              <a:round/>
+              <a:headEnd type="none" w="med" len="med"/>
+              <a:tailEnd type="none" w="med" len="med"/>
+            </a:ln>
+          </p:spPr>
+        </p:cxnSp>
+      </p:grpSp>
       <p:pic>
         <p:nvPicPr>
-          <p:cNvPr id="7" name="Picture 2">
-            <a:hlinkClick r:id="rId5" action="ppaction://program"/>
-          </p:cNvPr>
+          <p:cNvPr id="38" name="Picture 6"/>
           <p:cNvPicPr>
             <a:picLocks noChangeAspect="1" noChangeArrowheads="1"/>
           </p:cNvPicPr>
           <p:nvPr/>
         </p:nvPicPr>
         <p:blipFill>
-          <a:blip r:embed="rId6">
+          <a:blip r:embed="rId3">
             <a:extLst>
               <a:ext uri="{28A0092B-C50C-407E-A947-70E740481C1C}">
                 <a14:useLocalDpi xmlns:a14="http://schemas.microsoft.com/office/drawing/2010/main" val="0"/>
@@ -22451,8 +22947,8 @@
         </p:blipFill>
         <p:spPr bwMode="auto">
           <a:xfrm>
-            <a:off x="539552" y="4046811"/>
-            <a:ext cx="1096689" cy="1096689"/>
+            <a:off x="-316152" y="490460"/>
+            <a:ext cx="2123281" cy="803430"/>
           </a:xfrm>
           <a:prstGeom prst="rect">
             <a:avLst/>
@@ -22492,7 +22988,179 @@
           </a:extLst>
         </p:spPr>
       </p:pic>
+      <p:sp>
+        <p:nvSpPr>
+          <p:cNvPr id="2" name="AutoShape 2" descr="Estilo, cesta, ícone, alimento, esboço. Icon., isolado, teia, cesta,  vetorial, ícone, alimento, esboço, fundo, branca, | CanStock"/>
+          <p:cNvSpPr>
+            <a:spLocks noChangeAspect="1" noChangeArrowheads="1"/>
+          </p:cNvSpPr>
+          <p:nvPr/>
+        </p:nvSpPr>
+        <p:spPr bwMode="auto">
+          <a:xfrm>
+            <a:off x="155575" y="-822325"/>
+            <a:ext cx="1876425" cy="1714500"/>
+          </a:xfrm>
+          <a:prstGeom prst="rect">
+            <a:avLst/>
+          </a:prstGeom>
+          <a:noFill/>
+          <a:extLst>
+            <a:ext uri="{909E8E84-426E-40DD-AFC4-6F175D3DCCD1}">
+              <a14:hiddenFill xmlns:a14="http://schemas.microsoft.com/office/drawing/2010/main">
+                <a:solidFill>
+                  <a:srgbClr val="FFFFFF"/>
+                </a:solidFill>
+              </a14:hiddenFill>
+            </a:ext>
+          </a:extLst>
+        </p:spPr>
+        <p:txBody>
+          <a:bodyPr vert="horz" wrap="square" lIns="91440" tIns="45720" rIns="91440" bIns="45720" numCol="1" anchor="t" anchorCtr="0" compatLnSpc="1">
+            <a:prstTxWarp prst="textNoShape">
+              <a:avLst/>
+            </a:prstTxWarp>
+          </a:bodyPr>
+          <a:lstStyle/>
+          <a:p>
+            <a:endParaRPr lang="pt-BR"/>
+          </a:p>
+        </p:txBody>
+      </p:sp>
+      <p:pic>
+        <p:nvPicPr>
+          <p:cNvPr id="2050" name="Picture 2"/>
+          <p:cNvPicPr>
+            <a:picLocks noChangeAspect="1" noChangeArrowheads="1"/>
+          </p:cNvPicPr>
+          <p:nvPr/>
+        </p:nvPicPr>
+        <p:blipFill>
+          <a:blip r:embed="rId4">
+            <a:extLst>
+              <a:ext uri="{28A0092B-C50C-407E-A947-70E740481C1C}">
+                <a14:useLocalDpi xmlns:a14="http://schemas.microsoft.com/office/drawing/2010/main" val="0"/>
+              </a:ext>
+            </a:extLst>
+          </a:blip>
+          <a:srcRect/>
+          <a:stretch>
+            <a:fillRect/>
+          </a:stretch>
+        </p:blipFill>
+        <p:spPr bwMode="auto">
+          <a:xfrm>
+            <a:off x="782306" y="1509214"/>
+            <a:ext cx="869746" cy="869746"/>
+          </a:xfrm>
+          <a:prstGeom prst="rect">
+            <a:avLst/>
+          </a:prstGeom>
+          <a:noFill/>
+          <a:ln>
+            <a:noFill/>
+          </a:ln>
+          <a:effectLst/>
+          <a:extLst>
+            <a:ext uri="{909E8E84-426E-40DD-AFC4-6F175D3DCCD1}">
+              <a14:hiddenFill xmlns:a14="http://schemas.microsoft.com/office/drawing/2010/main">
+                <a:solidFill>
+                  <a:schemeClr val="accent1"/>
+                </a:solidFill>
+              </a14:hiddenFill>
+            </a:ext>
+            <a:ext uri="{91240B29-F687-4F45-9708-019B960494DF}">
+              <a14:hiddenLine xmlns:a14="http://schemas.microsoft.com/office/drawing/2010/main" w="9525">
+                <a:solidFill>
+                  <a:schemeClr val="tx1"/>
+                </a:solidFill>
+                <a:miter lim="800000"/>
+                <a:headEnd/>
+                <a:tailEnd/>
+              </a14:hiddenLine>
+            </a:ext>
+            <a:ext uri="{AF507438-7753-43E0-B8FC-AC1667EBCBE1}">
+              <a14:hiddenEffects xmlns:a14="http://schemas.microsoft.com/office/drawing/2010/main">
+                <a:effectLst>
+                  <a:outerShdw dist="35921" dir="2700000" algn="ctr" rotWithShape="0">
+                    <a:schemeClr val="bg2"/>
+                  </a:outerShdw>
+                </a:effectLst>
+              </a14:hiddenEffects>
+            </a:ext>
+          </a:extLst>
+        </p:spPr>
+      </p:pic>
+      <p:sp>
+        <p:nvSpPr>
+          <p:cNvPr id="28" name="Google Shape;535;p45"/>
+          <p:cNvSpPr txBox="1">
+            <a:spLocks noGrp="1"/>
+          </p:cNvSpPr>
+          <p:nvPr>
+            <p:ph type="subTitle" idx="3"/>
+          </p:nvPr>
+        </p:nvSpPr>
+        <p:spPr>
+          <a:xfrm>
+            <a:off x="1907704" y="2376186"/>
+            <a:ext cx="6408712" cy="2427811"/>
+          </a:xfrm>
+          <a:prstGeom prst="rect">
+            <a:avLst/>
+          </a:prstGeom>
+        </p:spPr>
+        <p:txBody>
+          <a:bodyPr spcFirstLastPara="1" wrap="square" lIns="91425" tIns="91425" rIns="91425" bIns="91425" anchor="t" anchorCtr="0">
+            <a:noAutofit/>
+          </a:bodyPr>
+          <a:lstStyle/>
+          <a:p>
+            <a:r>
+              <a:rPr lang="pt-BR" dirty="0">
+                <a:solidFill>
+                  <a:schemeClr val="bg2"/>
+                </a:solidFill>
+              </a:rPr>
+              <a:t>Validação de número de telefone: É importante validar os números de telefone dos clientes para garantir que eles estejam corretos e possam ser usados para fins de contato.</a:t>
+            </a:r>
+          </a:p>
+          <a:p>
+            <a:r>
+              <a:rPr lang="pt-BR" dirty="0" smtClean="0">
+                <a:solidFill>
+                  <a:schemeClr val="bg2"/>
+                </a:solidFill>
+              </a:rPr>
+              <a:t>Atualização </a:t>
+            </a:r>
+            <a:r>
+              <a:rPr lang="pt-BR" dirty="0">
+                <a:solidFill>
+                  <a:schemeClr val="bg2"/>
+                </a:solidFill>
+              </a:rPr>
+              <a:t>de informações de telefone: É importante permitir que os clientes atualizem suas informações de telefone a qualquer momento, para garantir que sempre haja um meio de contato válido.</a:t>
+            </a:r>
+          </a:p>
+          <a:p>
+            <a:r>
+              <a:rPr lang="pt-BR" dirty="0">
+                <a:solidFill>
+                  <a:schemeClr val="bg2"/>
+                </a:solidFill>
+              </a:rPr>
+              <a:t>Segurança de dados: É importante garantir a segurança dos dados dos telefones dos clientes, incluindo a proteção contra acesso não autorizado e vazamento de informações sensíveis.</a:t>
+            </a:r>
+          </a:p>
+        </p:txBody>
+      </p:sp>
     </p:spTree>
+    <p:extLst>
+      <p:ext uri="{BB962C8B-B14F-4D97-AF65-F5344CB8AC3E}">
+        <p14:creationId xmlns:p14="http://schemas.microsoft.com/office/powerpoint/2010/main" val="2688087895"/>
+      </p:ext>
+    </p:extLst>
   </p:cSld>
   <p:clrMapOvr>
     <a:masterClrMapping/>
@@ -22507,7 +23175,7 @@
 </p:sld>
 </file>
 
-<file path=ppt/slides/slide10.xml><?xml version="1.0" encoding="utf-8"?>
+<file path=ppt/slides/slide11.xml><?xml version="1.0" encoding="utf-8"?>
 <p:sld xmlns:a="http://schemas.openxmlformats.org/drawingml/2006/main" xmlns:r="http://schemas.openxmlformats.org/officeDocument/2006/relationships" xmlns:p="http://schemas.openxmlformats.org/presentationml/2006/main">
   <p:cSld>
     <p:bg>
@@ -23437,7 +24105,7 @@
 </p:sld>
 </file>
 
-<file path=ppt/slides/slide11.xml><?xml version="1.0" encoding="utf-8"?>
+<file path=ppt/slides/slide12.xml><?xml version="1.0" encoding="utf-8"?>
 <p:sld xmlns:a="http://schemas.openxmlformats.org/drawingml/2006/main" xmlns:r="http://schemas.openxmlformats.org/officeDocument/2006/relationships" xmlns:p="http://schemas.openxmlformats.org/presentationml/2006/main">
   <p:cSld>
     <p:bg>
@@ -23537,7 +24205,7 @@
         </p:nvSpPr>
         <p:spPr>
           <a:xfrm>
-            <a:off x="0" y="1185571"/>
+            <a:off x="0" y="2007543"/>
             <a:ext cx="3960813" cy="1284287"/>
           </a:xfrm>
           <a:prstGeom prst="rect">
@@ -23615,7 +24283,7 @@
         </p:nvSpPr>
         <p:spPr>
           <a:xfrm>
-            <a:off x="0" y="3291830"/>
+            <a:off x="0" y="3921734"/>
             <a:ext cx="3960813" cy="936625"/>
           </a:xfrm>
           <a:prstGeom prst="rect">
@@ -23691,7 +24359,7 @@
         </p:nvSpPr>
         <p:spPr>
           <a:xfrm>
-            <a:off x="0" y="2211710"/>
+            <a:off x="0" y="3075806"/>
             <a:ext cx="3960813" cy="935037"/>
           </a:xfrm>
           <a:prstGeom prst="rect">
@@ -23964,6 +24632,72 @@
           <a:xfrm>
             <a:off x="179512" y="195486"/>
             <a:ext cx="2123281" cy="803430"/>
+          </a:xfrm>
+          <a:prstGeom prst="rect">
+            <a:avLst/>
+          </a:prstGeom>
+          <a:noFill/>
+          <a:ln>
+            <a:noFill/>
+          </a:ln>
+          <a:effectLst/>
+          <a:extLst>
+            <a:ext uri="{909E8E84-426E-40DD-AFC4-6F175D3DCCD1}">
+              <a14:hiddenFill xmlns:a14="http://schemas.microsoft.com/office/drawing/2010/main">
+                <a:solidFill>
+                  <a:schemeClr val="accent1"/>
+                </a:solidFill>
+              </a14:hiddenFill>
+            </a:ext>
+            <a:ext uri="{91240B29-F687-4F45-9708-019B960494DF}">
+              <a14:hiddenLine xmlns:a14="http://schemas.microsoft.com/office/drawing/2010/main" w="9525">
+                <a:solidFill>
+                  <a:schemeClr val="tx1"/>
+                </a:solidFill>
+                <a:miter lim="800000"/>
+                <a:headEnd/>
+                <a:tailEnd/>
+              </a14:hiddenLine>
+            </a:ext>
+            <a:ext uri="{AF507438-7753-43E0-B8FC-AC1667EBCBE1}">
+              <a14:hiddenEffects xmlns:a14="http://schemas.microsoft.com/office/drawing/2010/main">
+                <a:effectLst>
+                  <a:outerShdw dist="35921" dir="2700000" algn="ctr" rotWithShape="0">
+                    <a:schemeClr val="bg2"/>
+                  </a:outerShdw>
+                </a:effectLst>
+              </a14:hiddenEffects>
+            </a:ext>
+          </a:extLst>
+        </p:spPr>
+      </p:pic>
+      <p:pic>
+        <p:nvPicPr>
+          <p:cNvPr id="3074" name="Picture 2">
+            <a:hlinkClick r:id="rId4" action="ppaction://program"/>
+          </p:cNvPr>
+          <p:cNvPicPr>
+            <a:picLocks noChangeAspect="1" noChangeArrowheads="1"/>
+          </p:cNvPicPr>
+          <p:nvPr/>
+        </p:nvPicPr>
+        <p:blipFill>
+          <a:blip r:embed="rId5">
+            <a:extLst>
+              <a:ext uri="{28A0092B-C50C-407E-A947-70E740481C1C}">
+                <a14:useLocalDpi xmlns:a14="http://schemas.microsoft.com/office/drawing/2010/main" val="0"/>
+              </a:ext>
+            </a:extLst>
+          </a:blip>
+          <a:srcRect/>
+          <a:stretch>
+            <a:fillRect/>
+          </a:stretch>
+        </p:blipFill>
+        <p:spPr bwMode="auto">
+          <a:xfrm>
+            <a:off x="3131840" y="655253"/>
+            <a:ext cx="1096689" cy="1096689"/>
           </a:xfrm>
           <a:prstGeom prst="rect">
             <a:avLst/>
@@ -24337,6 +25071,324 @@
           </a:p>
         </p:txBody>
       </p:sp>
+      <p:sp>
+        <p:nvSpPr>
+          <p:cNvPr id="14" name="Google Shape;672;p49"/>
+          <p:cNvSpPr txBox="1">
+            <a:spLocks/>
+          </p:cNvSpPr>
+          <p:nvPr/>
+        </p:nvSpPr>
+        <p:spPr>
+          <a:xfrm>
+            <a:off x="-37768" y="998917"/>
+            <a:ext cx="3960813" cy="1212794"/>
+          </a:xfrm>
+          <a:prstGeom prst="rect">
+            <a:avLst/>
+          </a:prstGeom>
+          <a:noFill/>
+          <a:ln w="3175">
+            <a:noFill/>
+          </a:ln>
+          <a:effectLst>
+            <a:glow rad="127000">
+              <a:schemeClr val="bg1"/>
+            </a:glow>
+          </a:effectLst>
+        </p:spPr>
+        <p:txBody>
+          <a:bodyPr spcFirstLastPara="1" wrap="square" lIns="162000" tIns="90000" rIns="162000" bIns="91425" anchor="ctr" anchorCtr="0">
+            <a:noAutofit/>
+          </a:bodyPr>
+          <a:lstStyle>
+            <a:defPPr marR="0" lvl="0" algn="l" rtl="0">
+              <a:lnSpc>
+                <a:spcPct val="100000"/>
+              </a:lnSpc>
+              <a:spcBef>
+                <a:spcPts val="0"/>
+              </a:spcBef>
+              <a:spcAft>
+                <a:spcPts val="0"/>
+              </a:spcAft>
+            </a:defPPr>
+            <a:lvl1pPr marL="457200" marR="0" lvl="0" indent="-342900" algn="l" rtl="0">
+              <a:lnSpc>
+                <a:spcPct val="115000"/>
+              </a:lnSpc>
+              <a:spcBef>
+                <a:spcPts val="0"/>
+              </a:spcBef>
+              <a:spcAft>
+                <a:spcPts val="0"/>
+              </a:spcAft>
+              <a:buClr>
+                <a:schemeClr val="dk1"/>
+              </a:buClr>
+              <a:buSzPts val="1800"/>
+              <a:buFont typeface="Red Hat Text"/>
+              <a:buChar char="●"/>
+              <a:defRPr sz="1800" b="0" i="0" u="none" strike="noStrike" cap="none">
+                <a:solidFill>
+                  <a:schemeClr val="dk1"/>
+                </a:solidFill>
+                <a:latin typeface="Red Hat Text"/>
+                <a:ea typeface="Red Hat Text"/>
+                <a:cs typeface="Red Hat Text"/>
+                <a:sym typeface="Red Hat Text"/>
+              </a:defRPr>
+            </a:lvl1pPr>
+            <a:lvl2pPr marL="914400" marR="0" lvl="1" indent="-317500" algn="l" rtl="0">
+              <a:lnSpc>
+                <a:spcPct val="115000"/>
+              </a:lnSpc>
+              <a:spcBef>
+                <a:spcPts val="1600"/>
+              </a:spcBef>
+              <a:spcAft>
+                <a:spcPts val="0"/>
+              </a:spcAft>
+              <a:buClr>
+                <a:schemeClr val="dk1"/>
+              </a:buClr>
+              <a:buSzPts val="1400"/>
+              <a:buFont typeface="Red Hat Text"/>
+              <a:buChar char="○"/>
+              <a:defRPr sz="1400" b="0" i="0" u="none" strike="noStrike" cap="none">
+                <a:solidFill>
+                  <a:schemeClr val="dk1"/>
+                </a:solidFill>
+                <a:latin typeface="Red Hat Text"/>
+                <a:ea typeface="Red Hat Text"/>
+                <a:cs typeface="Red Hat Text"/>
+                <a:sym typeface="Red Hat Text"/>
+              </a:defRPr>
+            </a:lvl2pPr>
+            <a:lvl3pPr marL="1371600" marR="0" lvl="2" indent="-317500" algn="l" rtl="0">
+              <a:lnSpc>
+                <a:spcPct val="115000"/>
+              </a:lnSpc>
+              <a:spcBef>
+                <a:spcPts val="1600"/>
+              </a:spcBef>
+              <a:spcAft>
+                <a:spcPts val="0"/>
+              </a:spcAft>
+              <a:buClr>
+                <a:schemeClr val="dk1"/>
+              </a:buClr>
+              <a:buSzPts val="1400"/>
+              <a:buFont typeface="Red Hat Text"/>
+              <a:buChar char="■"/>
+              <a:defRPr sz="1400" b="0" i="0" u="none" strike="noStrike" cap="none">
+                <a:solidFill>
+                  <a:schemeClr val="dk1"/>
+                </a:solidFill>
+                <a:latin typeface="Red Hat Text"/>
+                <a:ea typeface="Red Hat Text"/>
+                <a:cs typeface="Red Hat Text"/>
+                <a:sym typeface="Red Hat Text"/>
+              </a:defRPr>
+            </a:lvl3pPr>
+            <a:lvl4pPr marL="1828800" marR="0" lvl="3" indent="-317500" algn="l" rtl="0">
+              <a:lnSpc>
+                <a:spcPct val="115000"/>
+              </a:lnSpc>
+              <a:spcBef>
+                <a:spcPts val="1600"/>
+              </a:spcBef>
+              <a:spcAft>
+                <a:spcPts val="0"/>
+              </a:spcAft>
+              <a:buClr>
+                <a:schemeClr val="dk1"/>
+              </a:buClr>
+              <a:buSzPts val="1400"/>
+              <a:buFont typeface="Red Hat Text"/>
+              <a:buChar char="●"/>
+              <a:defRPr sz="1400" b="0" i="0" u="none" strike="noStrike" cap="none">
+                <a:solidFill>
+                  <a:schemeClr val="dk1"/>
+                </a:solidFill>
+                <a:latin typeface="Red Hat Text"/>
+                <a:ea typeface="Red Hat Text"/>
+                <a:cs typeface="Red Hat Text"/>
+                <a:sym typeface="Red Hat Text"/>
+              </a:defRPr>
+            </a:lvl4pPr>
+            <a:lvl5pPr marL="2286000" marR="0" lvl="4" indent="-317500" algn="l" rtl="0">
+              <a:lnSpc>
+                <a:spcPct val="115000"/>
+              </a:lnSpc>
+              <a:spcBef>
+                <a:spcPts val="1600"/>
+              </a:spcBef>
+              <a:spcAft>
+                <a:spcPts val="0"/>
+              </a:spcAft>
+              <a:buClr>
+                <a:schemeClr val="dk1"/>
+              </a:buClr>
+              <a:buSzPts val="1400"/>
+              <a:buFont typeface="Red Hat Text"/>
+              <a:buChar char="○"/>
+              <a:defRPr sz="1400" b="0" i="0" u="none" strike="noStrike" cap="none">
+                <a:solidFill>
+                  <a:schemeClr val="dk1"/>
+                </a:solidFill>
+                <a:latin typeface="Red Hat Text"/>
+                <a:ea typeface="Red Hat Text"/>
+                <a:cs typeface="Red Hat Text"/>
+                <a:sym typeface="Red Hat Text"/>
+              </a:defRPr>
+            </a:lvl5pPr>
+            <a:lvl6pPr marL="2743200" marR="0" lvl="5" indent="-317500" algn="l" rtl="0">
+              <a:lnSpc>
+                <a:spcPct val="115000"/>
+              </a:lnSpc>
+              <a:spcBef>
+                <a:spcPts val="1600"/>
+              </a:spcBef>
+              <a:spcAft>
+                <a:spcPts val="0"/>
+              </a:spcAft>
+              <a:buClr>
+                <a:schemeClr val="dk1"/>
+              </a:buClr>
+              <a:buSzPts val="1400"/>
+              <a:buFont typeface="Red Hat Text"/>
+              <a:buChar char="■"/>
+              <a:defRPr sz="1400" b="0" i="0" u="none" strike="noStrike" cap="none">
+                <a:solidFill>
+                  <a:schemeClr val="dk1"/>
+                </a:solidFill>
+                <a:latin typeface="Red Hat Text"/>
+                <a:ea typeface="Red Hat Text"/>
+                <a:cs typeface="Red Hat Text"/>
+                <a:sym typeface="Red Hat Text"/>
+              </a:defRPr>
+            </a:lvl6pPr>
+            <a:lvl7pPr marL="3200400" marR="0" lvl="6" indent="-317500" algn="l" rtl="0">
+              <a:lnSpc>
+                <a:spcPct val="115000"/>
+              </a:lnSpc>
+              <a:spcBef>
+                <a:spcPts val="1600"/>
+              </a:spcBef>
+              <a:spcAft>
+                <a:spcPts val="0"/>
+              </a:spcAft>
+              <a:buClr>
+                <a:schemeClr val="dk1"/>
+              </a:buClr>
+              <a:buSzPts val="1400"/>
+              <a:buFont typeface="Red Hat Text"/>
+              <a:buChar char="●"/>
+              <a:defRPr sz="1400" b="0" i="0" u="none" strike="noStrike" cap="none">
+                <a:solidFill>
+                  <a:schemeClr val="dk1"/>
+                </a:solidFill>
+                <a:latin typeface="Red Hat Text"/>
+                <a:ea typeface="Red Hat Text"/>
+                <a:cs typeface="Red Hat Text"/>
+                <a:sym typeface="Red Hat Text"/>
+              </a:defRPr>
+            </a:lvl7pPr>
+            <a:lvl8pPr marL="3657600" marR="0" lvl="7" indent="-317500" algn="l" rtl="0">
+              <a:lnSpc>
+                <a:spcPct val="115000"/>
+              </a:lnSpc>
+              <a:spcBef>
+                <a:spcPts val="1600"/>
+              </a:spcBef>
+              <a:spcAft>
+                <a:spcPts val="0"/>
+              </a:spcAft>
+              <a:buClr>
+                <a:schemeClr val="dk1"/>
+              </a:buClr>
+              <a:buSzPts val="1400"/>
+              <a:buFont typeface="Red Hat Text"/>
+              <a:buChar char="○"/>
+              <a:defRPr sz="1400" b="0" i="0" u="none" strike="noStrike" cap="none">
+                <a:solidFill>
+                  <a:schemeClr val="dk1"/>
+                </a:solidFill>
+                <a:latin typeface="Red Hat Text"/>
+                <a:ea typeface="Red Hat Text"/>
+                <a:cs typeface="Red Hat Text"/>
+                <a:sym typeface="Red Hat Text"/>
+              </a:defRPr>
+            </a:lvl8pPr>
+            <a:lvl9pPr marL="4114800" marR="0" lvl="8" indent="-317500" algn="l" rtl="0">
+              <a:lnSpc>
+                <a:spcPct val="115000"/>
+              </a:lnSpc>
+              <a:spcBef>
+                <a:spcPts val="1600"/>
+              </a:spcBef>
+              <a:spcAft>
+                <a:spcPts val="1600"/>
+              </a:spcAft>
+              <a:buClr>
+                <a:schemeClr val="dk1"/>
+              </a:buClr>
+              <a:buSzPts val="1400"/>
+              <a:buFont typeface="Red Hat Text"/>
+              <a:buChar char="■"/>
+              <a:defRPr sz="1400" b="0" i="0" u="none" strike="noStrike" cap="none">
+                <a:solidFill>
+                  <a:schemeClr val="dk1"/>
+                </a:solidFill>
+                <a:latin typeface="Red Hat Text"/>
+                <a:ea typeface="Red Hat Text"/>
+                <a:cs typeface="Red Hat Text"/>
+                <a:sym typeface="Red Hat Text"/>
+              </a:defRPr>
+            </a:lvl9pPr>
+          </a:lstStyle>
+          <a:p>
+            <a:endParaRPr lang="pt-BR" b="1" dirty="0" smtClean="0">
+              <a:solidFill>
+                <a:schemeClr val="bg1"/>
+              </a:solidFill>
+            </a:endParaRPr>
+          </a:p>
+          <a:p>
+            <a:r>
+              <a:rPr lang="pt-BR" b="1" dirty="0" smtClean="0">
+                <a:solidFill>
+                  <a:schemeClr val="bg1"/>
+                </a:solidFill>
+              </a:rPr>
+              <a:t>Usuários:</a:t>
+            </a:r>
+          </a:p>
+          <a:p>
+            <a:pPr marL="114300" indent="0">
+              <a:buFont typeface="Red Hat Text"/>
+              <a:buNone/>
+            </a:pPr>
+            <a:r>
+              <a:rPr lang="pt-BR" b="1" dirty="0" smtClean="0">
+                <a:solidFill>
+                  <a:schemeClr val="bg1"/>
+                </a:solidFill>
+              </a:rPr>
+              <a:t>Atributos: ID, Nome, Senha, email, Array de Acesso</a:t>
+            </a:r>
+          </a:p>
+          <a:p>
+            <a:pPr marL="0" indent="0"/>
+            <a:endParaRPr lang="pt-BR" b="1" dirty="0">
+              <a:solidFill>
+                <a:schemeClr val="bg1"/>
+              </a:solidFill>
+            </a:endParaRPr>
+          </a:p>
+        </p:txBody>
+      </p:sp>
     </p:spTree>
     <p:extLst>
       <p:ext uri="{BB962C8B-B14F-4D97-AF65-F5344CB8AC3E}">
@@ -24357,7 +25409,7 @@
 </p:sld>
 </file>
 
-<file path=ppt/slides/slide12.xml><?xml version="1.0" encoding="utf-8"?>
+<file path=ppt/slides/slide13.xml><?xml version="1.0" encoding="utf-8"?>
 <p:sld xmlns:a="http://schemas.openxmlformats.org/drawingml/2006/main" xmlns:r="http://schemas.openxmlformats.org/officeDocument/2006/relationships" xmlns:p="http://schemas.openxmlformats.org/presentationml/2006/main">
   <p:cSld>
     <p:bg>
@@ -24704,7 +25756,7 @@
       </p:sp>
       <p:pic>
         <p:nvPicPr>
-          <p:cNvPr id="2" name="Picture 4"/>
+          <p:cNvPr id="2051" name="Picture 3"/>
           <p:cNvPicPr>
             <a:picLocks noChangeAspect="1" noChangeArrowheads="1"/>
           </p:cNvPicPr>
@@ -24725,8 +25777,8 @@
         </p:blipFill>
         <p:spPr bwMode="auto">
           <a:xfrm>
-            <a:off x="1331640" y="483518"/>
-            <a:ext cx="6912767" cy="4535913"/>
+            <a:off x="1331640" y="487195"/>
+            <a:ext cx="6552727" cy="4467091"/>
           </a:xfrm>
           <a:prstGeom prst="rect">
             <a:avLst/>
@@ -24781,7 +25833,7 @@
 </p:sld>
 </file>
 
-<file path=ppt/slides/slide13.xml><?xml version="1.0" encoding="utf-8"?>
+<file path=ppt/slides/slide14.xml><?xml version="1.0" encoding="utf-8"?>
 <p:sld xmlns:a="http://schemas.openxmlformats.org/drawingml/2006/main" xmlns:r="http://schemas.openxmlformats.org/officeDocument/2006/relationships" xmlns:p="http://schemas.openxmlformats.org/presentationml/2006/main">
   <p:cSld>
     <p:bg>
@@ -25086,7 +26138,7 @@
       </p:sp>
       <p:pic>
         <p:nvPicPr>
-          <p:cNvPr id="3074" name="Picture 2"/>
+          <p:cNvPr id="1026" name="Picture 2"/>
           <p:cNvPicPr>
             <a:picLocks noChangeAspect="1" noChangeArrowheads="1"/>
           </p:cNvPicPr>
@@ -25107,8 +26159,8 @@
         </p:blipFill>
         <p:spPr bwMode="auto">
           <a:xfrm>
-            <a:off x="251520" y="483518"/>
-            <a:ext cx="8136904" cy="4568546"/>
+            <a:off x="1475656" y="516492"/>
+            <a:ext cx="6120680" cy="4503530"/>
           </a:xfrm>
           <a:prstGeom prst="rect">
             <a:avLst/>
@@ -25154,448 +26206,6 @@
         <p14:creationId xmlns:p14="http://schemas.microsoft.com/office/powerpoint/2010/main" val="3512406400"/>
       </p:ext>
     </p:extLst>
-  </p:cSld>
-  <p:clrMapOvr>
-    <a:masterClrMapping/>
-  </p:clrMapOvr>
-  <p:timing>
-    <p:tnLst>
-      <p:par>
-        <p:cTn id="1" dur="indefinite" restart="never" nodeType="tmRoot"/>
-      </p:par>
-    </p:tnLst>
-  </p:timing>
-</p:sld>
-</file>
-
-<file path=ppt/slides/slide14.xml><?xml version="1.0" encoding="utf-8"?>
-<p:sld xmlns:a="http://schemas.openxmlformats.org/drawingml/2006/main" xmlns:r="http://schemas.openxmlformats.org/officeDocument/2006/relationships" xmlns:p="http://schemas.openxmlformats.org/presentationml/2006/main">
-  <p:cSld>
-    <p:bg>
-      <p:bgPr>
-        <a:gradFill>
-          <a:gsLst>
-            <a:gs pos="100000">
-              <a:schemeClr val="bg1">
-                <a:lumMod val="95000"/>
-              </a:schemeClr>
-            </a:gs>
-            <a:gs pos="95000">
-              <a:schemeClr val="tx2">
-                <a:lumMod val="20000"/>
-                <a:lumOff val="80000"/>
-              </a:schemeClr>
-            </a:gs>
-          </a:gsLst>
-          <a:lin ang="5400000" scaled="0"/>
-        </a:gradFill>
-        <a:effectLst/>
-      </p:bgPr>
-    </p:bg>
-    <p:spTree>
-      <p:nvGrpSpPr>
-        <p:cNvPr id="1" name="Shape 1144"/>
-        <p:cNvGrpSpPr/>
-        <p:nvPr/>
-      </p:nvGrpSpPr>
-      <p:grpSpPr>
-        <a:xfrm>
-          <a:off x="0" y="0"/>
-          <a:ext cx="0" cy="0"/>
-          <a:chOff x="0" y="0"/>
-          <a:chExt cx="0" cy="0"/>
-        </a:xfrm>
-      </p:grpSpPr>
-      <p:sp>
-        <p:nvSpPr>
-          <p:cNvPr id="1146" name="Google Shape;1146;p53"/>
-          <p:cNvSpPr txBox="1">
-            <a:spLocks noGrp="1"/>
-          </p:cNvSpPr>
-          <p:nvPr>
-            <p:ph type="title"/>
-          </p:nvPr>
-        </p:nvSpPr>
-        <p:spPr>
-          <a:xfrm>
-            <a:off x="1691680" y="267494"/>
-            <a:ext cx="5040560" cy="647700"/>
-          </a:xfrm>
-          <a:prstGeom prst="rect">
-            <a:avLst/>
-          </a:prstGeom>
-        </p:spPr>
-        <p:txBody>
-          <a:bodyPr spcFirstLastPara="1" wrap="square" lIns="91425" tIns="91425" rIns="91425" bIns="91425" anchor="ctr" anchorCtr="0">
-            <a:noAutofit/>
-          </a:bodyPr>
-          <a:lstStyle/>
-          <a:p>
-            <a:pPr marL="0" lvl="0" indent="0" algn="l" rtl="0">
-              <a:spcBef>
-                <a:spcPts val="0"/>
-              </a:spcBef>
-              <a:spcAft>
-                <a:spcPts val="0"/>
-              </a:spcAft>
-              <a:buNone/>
-            </a:pPr>
-            <a:r>
-              <a:rPr lang="en" dirty="0" smtClean="0"/>
-              <a:t>Criação das Tabelas na 3FN</a:t>
-            </a:r>
-            <a:endParaRPr dirty="0"/>
-          </a:p>
-        </p:txBody>
-      </p:sp>
-      <p:pic>
-        <p:nvPicPr>
-          <p:cNvPr id="4098" name="Picture 2"/>
-          <p:cNvPicPr>
-            <a:picLocks noChangeAspect="1" noChangeArrowheads="1"/>
-          </p:cNvPicPr>
-          <p:nvPr/>
-        </p:nvPicPr>
-        <p:blipFill>
-          <a:blip r:embed="rId3">
-            <a:extLst>
-              <a:ext uri="{28A0092B-C50C-407E-A947-70E740481C1C}">
-                <a14:useLocalDpi xmlns:a14="http://schemas.microsoft.com/office/drawing/2010/main" val="0"/>
-              </a:ext>
-            </a:extLst>
-          </a:blip>
-          <a:srcRect/>
-          <a:stretch>
-            <a:fillRect/>
-          </a:stretch>
-        </p:blipFill>
-        <p:spPr bwMode="auto">
-          <a:xfrm>
-            <a:off x="150095" y="1923678"/>
-            <a:ext cx="8791864" cy="2290564"/>
-          </a:xfrm>
-          <a:prstGeom prst="rect">
-            <a:avLst/>
-          </a:prstGeom>
-          <a:noFill/>
-          <a:ln>
-            <a:noFill/>
-          </a:ln>
-          <a:effectLst/>
-          <a:extLst>
-            <a:ext uri="{909E8E84-426E-40DD-AFC4-6F175D3DCCD1}">
-              <a14:hiddenFill xmlns:a14="http://schemas.microsoft.com/office/drawing/2010/main">
-                <a:solidFill>
-                  <a:schemeClr val="accent1"/>
-                </a:solidFill>
-              </a14:hiddenFill>
-            </a:ext>
-            <a:ext uri="{91240B29-F687-4F45-9708-019B960494DF}">
-              <a14:hiddenLine xmlns:a14="http://schemas.microsoft.com/office/drawing/2010/main" w="9525">
-                <a:solidFill>
-                  <a:schemeClr val="tx1"/>
-                </a:solidFill>
-                <a:miter lim="800000"/>
-                <a:headEnd/>
-                <a:tailEnd/>
-              </a14:hiddenLine>
-            </a:ext>
-            <a:ext uri="{AF507438-7753-43E0-B8FC-AC1667EBCBE1}">
-              <a14:hiddenEffects xmlns:a14="http://schemas.microsoft.com/office/drawing/2010/main">
-                <a:effectLst>
-                  <a:outerShdw dist="35921" dir="2700000" algn="ctr" rotWithShape="0">
-                    <a:schemeClr val="bg2"/>
-                  </a:outerShdw>
-                </a:effectLst>
-              </a14:hiddenEffects>
-            </a:ext>
-          </a:extLst>
-        </p:spPr>
-      </p:pic>
-      <p:sp>
-        <p:nvSpPr>
-          <p:cNvPr id="11" name="Google Shape;1146;p53"/>
-          <p:cNvSpPr txBox="1">
-            <a:spLocks/>
-          </p:cNvSpPr>
-          <p:nvPr/>
-        </p:nvSpPr>
-        <p:spPr>
-          <a:xfrm>
-            <a:off x="467544" y="1045754"/>
-            <a:ext cx="7704856" cy="647700"/>
-          </a:xfrm>
-          <a:prstGeom prst="rect">
-            <a:avLst/>
-          </a:prstGeom>
-          <a:solidFill>
-            <a:srgbClr val="FFD119"/>
-          </a:solidFill>
-          <a:ln>
-            <a:noFill/>
-          </a:ln>
-        </p:spPr>
-        <p:txBody>
-          <a:bodyPr spcFirstLastPara="1" wrap="square" lIns="91425" tIns="91425" rIns="91425" bIns="91425" anchor="ctr" anchorCtr="0">
-            <a:noAutofit/>
-          </a:bodyPr>
-          <a:lstStyle>
-            <a:defPPr marR="0" lvl="0" algn="l" rtl="0">
-              <a:lnSpc>
-                <a:spcPct val="100000"/>
-              </a:lnSpc>
-              <a:spcBef>
-                <a:spcPts val="0"/>
-              </a:spcBef>
-              <a:spcAft>
-                <a:spcPts val="0"/>
-              </a:spcAft>
-            </a:defPPr>
-            <a:lvl1pPr marR="0" lvl="0" algn="l" rtl="0">
-              <a:lnSpc>
-                <a:spcPct val="100000"/>
-              </a:lnSpc>
-              <a:spcBef>
-                <a:spcPts val="0"/>
-              </a:spcBef>
-              <a:spcAft>
-                <a:spcPts val="0"/>
-              </a:spcAft>
-              <a:buClr>
-                <a:srgbClr val="5C0B68"/>
-              </a:buClr>
-              <a:buSzPts val="2800"/>
-              <a:buFont typeface="Red Hat Text"/>
-              <a:buNone/>
-              <a:defRPr sz="2800" b="1" i="0" u="none" strike="noStrike" cap="none">
-                <a:solidFill>
-                  <a:srgbClr val="5C0B68"/>
-                </a:solidFill>
-                <a:latin typeface="Red Hat Text"/>
-                <a:ea typeface="Red Hat Text"/>
-                <a:cs typeface="Red Hat Text"/>
-                <a:sym typeface="Red Hat Text"/>
-              </a:defRPr>
-            </a:lvl1pPr>
-            <a:lvl2pPr marR="0" lvl="1" algn="ctr" rtl="0">
-              <a:lnSpc>
-                <a:spcPct val="100000"/>
-              </a:lnSpc>
-              <a:spcBef>
-                <a:spcPts val="0"/>
-              </a:spcBef>
-              <a:spcAft>
-                <a:spcPts val="0"/>
-              </a:spcAft>
-              <a:buClr>
-                <a:schemeClr val="dk1"/>
-              </a:buClr>
-              <a:buSzPts val="2800"/>
-              <a:buFont typeface="Red Hat Text"/>
-              <a:buNone/>
-              <a:defRPr sz="2800" b="1" i="0" u="none" strike="noStrike" cap="none">
-                <a:solidFill>
-                  <a:schemeClr val="dk1"/>
-                </a:solidFill>
-                <a:latin typeface="Red Hat Text"/>
-                <a:ea typeface="Red Hat Text"/>
-                <a:cs typeface="Red Hat Text"/>
-                <a:sym typeface="Red Hat Text"/>
-              </a:defRPr>
-            </a:lvl2pPr>
-            <a:lvl3pPr marR="0" lvl="2" algn="ctr" rtl="0">
-              <a:lnSpc>
-                <a:spcPct val="100000"/>
-              </a:lnSpc>
-              <a:spcBef>
-                <a:spcPts val="0"/>
-              </a:spcBef>
-              <a:spcAft>
-                <a:spcPts val="0"/>
-              </a:spcAft>
-              <a:buClr>
-                <a:schemeClr val="dk1"/>
-              </a:buClr>
-              <a:buSzPts val="2800"/>
-              <a:buFont typeface="Red Hat Text"/>
-              <a:buNone/>
-              <a:defRPr sz="2800" b="1" i="0" u="none" strike="noStrike" cap="none">
-                <a:solidFill>
-                  <a:schemeClr val="dk1"/>
-                </a:solidFill>
-                <a:latin typeface="Red Hat Text"/>
-                <a:ea typeface="Red Hat Text"/>
-                <a:cs typeface="Red Hat Text"/>
-                <a:sym typeface="Red Hat Text"/>
-              </a:defRPr>
-            </a:lvl3pPr>
-            <a:lvl4pPr marR="0" lvl="3" algn="ctr" rtl="0">
-              <a:lnSpc>
-                <a:spcPct val="100000"/>
-              </a:lnSpc>
-              <a:spcBef>
-                <a:spcPts val="0"/>
-              </a:spcBef>
-              <a:spcAft>
-                <a:spcPts val="0"/>
-              </a:spcAft>
-              <a:buClr>
-                <a:schemeClr val="dk1"/>
-              </a:buClr>
-              <a:buSzPts val="2800"/>
-              <a:buFont typeface="Red Hat Text"/>
-              <a:buNone/>
-              <a:defRPr sz="2800" b="1" i="0" u="none" strike="noStrike" cap="none">
-                <a:solidFill>
-                  <a:schemeClr val="dk1"/>
-                </a:solidFill>
-                <a:latin typeface="Red Hat Text"/>
-                <a:ea typeface="Red Hat Text"/>
-                <a:cs typeface="Red Hat Text"/>
-                <a:sym typeface="Red Hat Text"/>
-              </a:defRPr>
-            </a:lvl4pPr>
-            <a:lvl5pPr marR="0" lvl="4" algn="ctr" rtl="0">
-              <a:lnSpc>
-                <a:spcPct val="100000"/>
-              </a:lnSpc>
-              <a:spcBef>
-                <a:spcPts val="0"/>
-              </a:spcBef>
-              <a:spcAft>
-                <a:spcPts val="0"/>
-              </a:spcAft>
-              <a:buClr>
-                <a:schemeClr val="dk1"/>
-              </a:buClr>
-              <a:buSzPts val="2800"/>
-              <a:buFont typeface="Red Hat Text"/>
-              <a:buNone/>
-              <a:defRPr sz="2800" b="1" i="0" u="none" strike="noStrike" cap="none">
-                <a:solidFill>
-                  <a:schemeClr val="dk1"/>
-                </a:solidFill>
-                <a:latin typeface="Red Hat Text"/>
-                <a:ea typeface="Red Hat Text"/>
-                <a:cs typeface="Red Hat Text"/>
-                <a:sym typeface="Red Hat Text"/>
-              </a:defRPr>
-            </a:lvl5pPr>
-            <a:lvl6pPr marR="0" lvl="5" algn="ctr" rtl="0">
-              <a:lnSpc>
-                <a:spcPct val="100000"/>
-              </a:lnSpc>
-              <a:spcBef>
-                <a:spcPts val="0"/>
-              </a:spcBef>
-              <a:spcAft>
-                <a:spcPts val="0"/>
-              </a:spcAft>
-              <a:buClr>
-                <a:schemeClr val="dk1"/>
-              </a:buClr>
-              <a:buSzPts val="2800"/>
-              <a:buFont typeface="Red Hat Text"/>
-              <a:buNone/>
-              <a:defRPr sz="2800" b="1" i="0" u="none" strike="noStrike" cap="none">
-                <a:solidFill>
-                  <a:schemeClr val="dk1"/>
-                </a:solidFill>
-                <a:latin typeface="Red Hat Text"/>
-                <a:ea typeface="Red Hat Text"/>
-                <a:cs typeface="Red Hat Text"/>
-                <a:sym typeface="Red Hat Text"/>
-              </a:defRPr>
-            </a:lvl6pPr>
-            <a:lvl7pPr marR="0" lvl="6" algn="ctr" rtl="0">
-              <a:lnSpc>
-                <a:spcPct val="100000"/>
-              </a:lnSpc>
-              <a:spcBef>
-                <a:spcPts val="0"/>
-              </a:spcBef>
-              <a:spcAft>
-                <a:spcPts val="0"/>
-              </a:spcAft>
-              <a:buClr>
-                <a:schemeClr val="dk1"/>
-              </a:buClr>
-              <a:buSzPts val="2800"/>
-              <a:buFont typeface="Red Hat Text"/>
-              <a:buNone/>
-              <a:defRPr sz="2800" b="1" i="0" u="none" strike="noStrike" cap="none">
-                <a:solidFill>
-                  <a:schemeClr val="dk1"/>
-                </a:solidFill>
-                <a:latin typeface="Red Hat Text"/>
-                <a:ea typeface="Red Hat Text"/>
-                <a:cs typeface="Red Hat Text"/>
-                <a:sym typeface="Red Hat Text"/>
-              </a:defRPr>
-            </a:lvl7pPr>
-            <a:lvl8pPr marR="0" lvl="7" algn="ctr" rtl="0">
-              <a:lnSpc>
-                <a:spcPct val="100000"/>
-              </a:lnSpc>
-              <a:spcBef>
-                <a:spcPts val="0"/>
-              </a:spcBef>
-              <a:spcAft>
-                <a:spcPts val="0"/>
-              </a:spcAft>
-              <a:buClr>
-                <a:schemeClr val="dk1"/>
-              </a:buClr>
-              <a:buSzPts val="2800"/>
-              <a:buFont typeface="Red Hat Text"/>
-              <a:buNone/>
-              <a:defRPr sz="2800" b="1" i="0" u="none" strike="noStrike" cap="none">
-                <a:solidFill>
-                  <a:schemeClr val="dk1"/>
-                </a:solidFill>
-                <a:latin typeface="Red Hat Text"/>
-                <a:ea typeface="Red Hat Text"/>
-                <a:cs typeface="Red Hat Text"/>
-                <a:sym typeface="Red Hat Text"/>
-              </a:defRPr>
-            </a:lvl8pPr>
-            <a:lvl9pPr marR="0" lvl="8" algn="ctr" rtl="0">
-              <a:lnSpc>
-                <a:spcPct val="100000"/>
-              </a:lnSpc>
-              <a:spcBef>
-                <a:spcPts val="0"/>
-              </a:spcBef>
-              <a:spcAft>
-                <a:spcPts val="0"/>
-              </a:spcAft>
-              <a:buClr>
-                <a:schemeClr val="dk1"/>
-              </a:buClr>
-              <a:buSzPts val="2800"/>
-              <a:buFont typeface="Red Hat Text"/>
-              <a:buNone/>
-              <a:defRPr sz="2800" b="1" i="0" u="none" strike="noStrike" cap="none">
-                <a:solidFill>
-                  <a:schemeClr val="dk1"/>
-                </a:solidFill>
-                <a:latin typeface="Red Hat Text"/>
-                <a:ea typeface="Red Hat Text"/>
-                <a:cs typeface="Red Hat Text"/>
-                <a:sym typeface="Red Hat Text"/>
-              </a:defRPr>
-            </a:lvl9pPr>
-          </a:lstStyle>
-          <a:p>
-            <a:r>
-              <a:rPr lang="pt-BR" sz="2400" dirty="0" smtClean="0"/>
-              <a:t>Tabela Produtos Preenchida com dados de Teste</a:t>
-            </a:r>
-            <a:endParaRPr lang="pt-BR" sz="2400" dirty="0"/>
-          </a:p>
-        </p:txBody>
-      </p:sp>
-    </p:spTree>
   </p:cSld>
   <p:clrMapOvr>
     <a:masterClrMapping/>
@@ -25690,6 +26300,448 @@
           </a:p>
         </p:txBody>
       </p:sp>
+      <p:pic>
+        <p:nvPicPr>
+          <p:cNvPr id="4098" name="Picture 2"/>
+          <p:cNvPicPr>
+            <a:picLocks noChangeAspect="1" noChangeArrowheads="1"/>
+          </p:cNvPicPr>
+          <p:nvPr/>
+        </p:nvPicPr>
+        <p:blipFill>
+          <a:blip r:embed="rId3">
+            <a:extLst>
+              <a:ext uri="{28A0092B-C50C-407E-A947-70E740481C1C}">
+                <a14:useLocalDpi xmlns:a14="http://schemas.microsoft.com/office/drawing/2010/main" val="0"/>
+              </a:ext>
+            </a:extLst>
+          </a:blip>
+          <a:srcRect/>
+          <a:stretch>
+            <a:fillRect/>
+          </a:stretch>
+        </p:blipFill>
+        <p:spPr bwMode="auto">
+          <a:xfrm>
+            <a:off x="150095" y="1923678"/>
+            <a:ext cx="8791864" cy="2290564"/>
+          </a:xfrm>
+          <a:prstGeom prst="rect">
+            <a:avLst/>
+          </a:prstGeom>
+          <a:noFill/>
+          <a:ln>
+            <a:noFill/>
+          </a:ln>
+          <a:effectLst/>
+          <a:extLst>
+            <a:ext uri="{909E8E84-426E-40DD-AFC4-6F175D3DCCD1}">
+              <a14:hiddenFill xmlns:a14="http://schemas.microsoft.com/office/drawing/2010/main">
+                <a:solidFill>
+                  <a:schemeClr val="accent1"/>
+                </a:solidFill>
+              </a14:hiddenFill>
+            </a:ext>
+            <a:ext uri="{91240B29-F687-4F45-9708-019B960494DF}">
+              <a14:hiddenLine xmlns:a14="http://schemas.microsoft.com/office/drawing/2010/main" w="9525">
+                <a:solidFill>
+                  <a:schemeClr val="tx1"/>
+                </a:solidFill>
+                <a:miter lim="800000"/>
+                <a:headEnd/>
+                <a:tailEnd/>
+              </a14:hiddenLine>
+            </a:ext>
+            <a:ext uri="{AF507438-7753-43E0-B8FC-AC1667EBCBE1}">
+              <a14:hiddenEffects xmlns:a14="http://schemas.microsoft.com/office/drawing/2010/main">
+                <a:effectLst>
+                  <a:outerShdw dist="35921" dir="2700000" algn="ctr" rotWithShape="0">
+                    <a:schemeClr val="bg2"/>
+                  </a:outerShdw>
+                </a:effectLst>
+              </a14:hiddenEffects>
+            </a:ext>
+          </a:extLst>
+        </p:spPr>
+      </p:pic>
+      <p:sp>
+        <p:nvSpPr>
+          <p:cNvPr id="11" name="Google Shape;1146;p53"/>
+          <p:cNvSpPr txBox="1">
+            <a:spLocks/>
+          </p:cNvSpPr>
+          <p:nvPr/>
+        </p:nvSpPr>
+        <p:spPr>
+          <a:xfrm>
+            <a:off x="467544" y="1045754"/>
+            <a:ext cx="7704856" cy="647700"/>
+          </a:xfrm>
+          <a:prstGeom prst="rect">
+            <a:avLst/>
+          </a:prstGeom>
+          <a:solidFill>
+            <a:srgbClr val="FFD119"/>
+          </a:solidFill>
+          <a:ln>
+            <a:noFill/>
+          </a:ln>
+        </p:spPr>
+        <p:txBody>
+          <a:bodyPr spcFirstLastPara="1" wrap="square" lIns="91425" tIns="91425" rIns="91425" bIns="91425" anchor="ctr" anchorCtr="0">
+            <a:noAutofit/>
+          </a:bodyPr>
+          <a:lstStyle>
+            <a:defPPr marR="0" lvl="0" algn="l" rtl="0">
+              <a:lnSpc>
+                <a:spcPct val="100000"/>
+              </a:lnSpc>
+              <a:spcBef>
+                <a:spcPts val="0"/>
+              </a:spcBef>
+              <a:spcAft>
+                <a:spcPts val="0"/>
+              </a:spcAft>
+            </a:defPPr>
+            <a:lvl1pPr marR="0" lvl="0" algn="l" rtl="0">
+              <a:lnSpc>
+                <a:spcPct val="100000"/>
+              </a:lnSpc>
+              <a:spcBef>
+                <a:spcPts val="0"/>
+              </a:spcBef>
+              <a:spcAft>
+                <a:spcPts val="0"/>
+              </a:spcAft>
+              <a:buClr>
+                <a:srgbClr val="5C0B68"/>
+              </a:buClr>
+              <a:buSzPts val="2800"/>
+              <a:buFont typeface="Red Hat Text"/>
+              <a:buNone/>
+              <a:defRPr sz="2800" b="1" i="0" u="none" strike="noStrike" cap="none">
+                <a:solidFill>
+                  <a:srgbClr val="5C0B68"/>
+                </a:solidFill>
+                <a:latin typeface="Red Hat Text"/>
+                <a:ea typeface="Red Hat Text"/>
+                <a:cs typeface="Red Hat Text"/>
+                <a:sym typeface="Red Hat Text"/>
+              </a:defRPr>
+            </a:lvl1pPr>
+            <a:lvl2pPr marR="0" lvl="1" algn="ctr" rtl="0">
+              <a:lnSpc>
+                <a:spcPct val="100000"/>
+              </a:lnSpc>
+              <a:spcBef>
+                <a:spcPts val="0"/>
+              </a:spcBef>
+              <a:spcAft>
+                <a:spcPts val="0"/>
+              </a:spcAft>
+              <a:buClr>
+                <a:schemeClr val="dk1"/>
+              </a:buClr>
+              <a:buSzPts val="2800"/>
+              <a:buFont typeface="Red Hat Text"/>
+              <a:buNone/>
+              <a:defRPr sz="2800" b="1" i="0" u="none" strike="noStrike" cap="none">
+                <a:solidFill>
+                  <a:schemeClr val="dk1"/>
+                </a:solidFill>
+                <a:latin typeface="Red Hat Text"/>
+                <a:ea typeface="Red Hat Text"/>
+                <a:cs typeface="Red Hat Text"/>
+                <a:sym typeface="Red Hat Text"/>
+              </a:defRPr>
+            </a:lvl2pPr>
+            <a:lvl3pPr marR="0" lvl="2" algn="ctr" rtl="0">
+              <a:lnSpc>
+                <a:spcPct val="100000"/>
+              </a:lnSpc>
+              <a:spcBef>
+                <a:spcPts val="0"/>
+              </a:spcBef>
+              <a:spcAft>
+                <a:spcPts val="0"/>
+              </a:spcAft>
+              <a:buClr>
+                <a:schemeClr val="dk1"/>
+              </a:buClr>
+              <a:buSzPts val="2800"/>
+              <a:buFont typeface="Red Hat Text"/>
+              <a:buNone/>
+              <a:defRPr sz="2800" b="1" i="0" u="none" strike="noStrike" cap="none">
+                <a:solidFill>
+                  <a:schemeClr val="dk1"/>
+                </a:solidFill>
+                <a:latin typeface="Red Hat Text"/>
+                <a:ea typeface="Red Hat Text"/>
+                <a:cs typeface="Red Hat Text"/>
+                <a:sym typeface="Red Hat Text"/>
+              </a:defRPr>
+            </a:lvl3pPr>
+            <a:lvl4pPr marR="0" lvl="3" algn="ctr" rtl="0">
+              <a:lnSpc>
+                <a:spcPct val="100000"/>
+              </a:lnSpc>
+              <a:spcBef>
+                <a:spcPts val="0"/>
+              </a:spcBef>
+              <a:spcAft>
+                <a:spcPts val="0"/>
+              </a:spcAft>
+              <a:buClr>
+                <a:schemeClr val="dk1"/>
+              </a:buClr>
+              <a:buSzPts val="2800"/>
+              <a:buFont typeface="Red Hat Text"/>
+              <a:buNone/>
+              <a:defRPr sz="2800" b="1" i="0" u="none" strike="noStrike" cap="none">
+                <a:solidFill>
+                  <a:schemeClr val="dk1"/>
+                </a:solidFill>
+                <a:latin typeface="Red Hat Text"/>
+                <a:ea typeface="Red Hat Text"/>
+                <a:cs typeface="Red Hat Text"/>
+                <a:sym typeface="Red Hat Text"/>
+              </a:defRPr>
+            </a:lvl4pPr>
+            <a:lvl5pPr marR="0" lvl="4" algn="ctr" rtl="0">
+              <a:lnSpc>
+                <a:spcPct val="100000"/>
+              </a:lnSpc>
+              <a:spcBef>
+                <a:spcPts val="0"/>
+              </a:spcBef>
+              <a:spcAft>
+                <a:spcPts val="0"/>
+              </a:spcAft>
+              <a:buClr>
+                <a:schemeClr val="dk1"/>
+              </a:buClr>
+              <a:buSzPts val="2800"/>
+              <a:buFont typeface="Red Hat Text"/>
+              <a:buNone/>
+              <a:defRPr sz="2800" b="1" i="0" u="none" strike="noStrike" cap="none">
+                <a:solidFill>
+                  <a:schemeClr val="dk1"/>
+                </a:solidFill>
+                <a:latin typeface="Red Hat Text"/>
+                <a:ea typeface="Red Hat Text"/>
+                <a:cs typeface="Red Hat Text"/>
+                <a:sym typeface="Red Hat Text"/>
+              </a:defRPr>
+            </a:lvl5pPr>
+            <a:lvl6pPr marR="0" lvl="5" algn="ctr" rtl="0">
+              <a:lnSpc>
+                <a:spcPct val="100000"/>
+              </a:lnSpc>
+              <a:spcBef>
+                <a:spcPts val="0"/>
+              </a:spcBef>
+              <a:spcAft>
+                <a:spcPts val="0"/>
+              </a:spcAft>
+              <a:buClr>
+                <a:schemeClr val="dk1"/>
+              </a:buClr>
+              <a:buSzPts val="2800"/>
+              <a:buFont typeface="Red Hat Text"/>
+              <a:buNone/>
+              <a:defRPr sz="2800" b="1" i="0" u="none" strike="noStrike" cap="none">
+                <a:solidFill>
+                  <a:schemeClr val="dk1"/>
+                </a:solidFill>
+                <a:latin typeface="Red Hat Text"/>
+                <a:ea typeface="Red Hat Text"/>
+                <a:cs typeface="Red Hat Text"/>
+                <a:sym typeface="Red Hat Text"/>
+              </a:defRPr>
+            </a:lvl6pPr>
+            <a:lvl7pPr marR="0" lvl="6" algn="ctr" rtl="0">
+              <a:lnSpc>
+                <a:spcPct val="100000"/>
+              </a:lnSpc>
+              <a:spcBef>
+                <a:spcPts val="0"/>
+              </a:spcBef>
+              <a:spcAft>
+                <a:spcPts val="0"/>
+              </a:spcAft>
+              <a:buClr>
+                <a:schemeClr val="dk1"/>
+              </a:buClr>
+              <a:buSzPts val="2800"/>
+              <a:buFont typeface="Red Hat Text"/>
+              <a:buNone/>
+              <a:defRPr sz="2800" b="1" i="0" u="none" strike="noStrike" cap="none">
+                <a:solidFill>
+                  <a:schemeClr val="dk1"/>
+                </a:solidFill>
+                <a:latin typeface="Red Hat Text"/>
+                <a:ea typeface="Red Hat Text"/>
+                <a:cs typeface="Red Hat Text"/>
+                <a:sym typeface="Red Hat Text"/>
+              </a:defRPr>
+            </a:lvl7pPr>
+            <a:lvl8pPr marR="0" lvl="7" algn="ctr" rtl="0">
+              <a:lnSpc>
+                <a:spcPct val="100000"/>
+              </a:lnSpc>
+              <a:spcBef>
+                <a:spcPts val="0"/>
+              </a:spcBef>
+              <a:spcAft>
+                <a:spcPts val="0"/>
+              </a:spcAft>
+              <a:buClr>
+                <a:schemeClr val="dk1"/>
+              </a:buClr>
+              <a:buSzPts val="2800"/>
+              <a:buFont typeface="Red Hat Text"/>
+              <a:buNone/>
+              <a:defRPr sz="2800" b="1" i="0" u="none" strike="noStrike" cap="none">
+                <a:solidFill>
+                  <a:schemeClr val="dk1"/>
+                </a:solidFill>
+                <a:latin typeface="Red Hat Text"/>
+                <a:ea typeface="Red Hat Text"/>
+                <a:cs typeface="Red Hat Text"/>
+                <a:sym typeface="Red Hat Text"/>
+              </a:defRPr>
+            </a:lvl8pPr>
+            <a:lvl9pPr marR="0" lvl="8" algn="ctr" rtl="0">
+              <a:lnSpc>
+                <a:spcPct val="100000"/>
+              </a:lnSpc>
+              <a:spcBef>
+                <a:spcPts val="0"/>
+              </a:spcBef>
+              <a:spcAft>
+                <a:spcPts val="0"/>
+              </a:spcAft>
+              <a:buClr>
+                <a:schemeClr val="dk1"/>
+              </a:buClr>
+              <a:buSzPts val="2800"/>
+              <a:buFont typeface="Red Hat Text"/>
+              <a:buNone/>
+              <a:defRPr sz="2800" b="1" i="0" u="none" strike="noStrike" cap="none">
+                <a:solidFill>
+                  <a:schemeClr val="dk1"/>
+                </a:solidFill>
+                <a:latin typeface="Red Hat Text"/>
+                <a:ea typeface="Red Hat Text"/>
+                <a:cs typeface="Red Hat Text"/>
+                <a:sym typeface="Red Hat Text"/>
+              </a:defRPr>
+            </a:lvl9pPr>
+          </a:lstStyle>
+          <a:p>
+            <a:r>
+              <a:rPr lang="pt-BR" sz="2400" dirty="0" smtClean="0"/>
+              <a:t>Tabela Produtos Preenchida com dados de Teste</a:t>
+            </a:r>
+            <a:endParaRPr lang="pt-BR" sz="2400" dirty="0"/>
+          </a:p>
+        </p:txBody>
+      </p:sp>
+    </p:spTree>
+  </p:cSld>
+  <p:clrMapOvr>
+    <a:masterClrMapping/>
+  </p:clrMapOvr>
+  <p:timing>
+    <p:tnLst>
+      <p:par>
+        <p:cTn id="1" dur="indefinite" restart="never" nodeType="tmRoot"/>
+      </p:par>
+    </p:tnLst>
+  </p:timing>
+</p:sld>
+</file>
+
+<file path=ppt/slides/slide16.xml><?xml version="1.0" encoding="utf-8"?>
+<p:sld xmlns:a="http://schemas.openxmlformats.org/drawingml/2006/main" xmlns:r="http://schemas.openxmlformats.org/officeDocument/2006/relationships" xmlns:p="http://schemas.openxmlformats.org/presentationml/2006/main">
+  <p:cSld>
+    <p:bg>
+      <p:bgPr>
+        <a:gradFill>
+          <a:gsLst>
+            <a:gs pos="100000">
+              <a:schemeClr val="bg1">
+                <a:lumMod val="95000"/>
+              </a:schemeClr>
+            </a:gs>
+            <a:gs pos="95000">
+              <a:schemeClr val="tx2">
+                <a:lumMod val="20000"/>
+                <a:lumOff val="80000"/>
+              </a:schemeClr>
+            </a:gs>
+          </a:gsLst>
+          <a:lin ang="5400000" scaled="0"/>
+        </a:gradFill>
+        <a:effectLst/>
+      </p:bgPr>
+    </p:bg>
+    <p:spTree>
+      <p:nvGrpSpPr>
+        <p:cNvPr id="1" name="Shape 1144"/>
+        <p:cNvGrpSpPr/>
+        <p:nvPr/>
+      </p:nvGrpSpPr>
+      <p:grpSpPr>
+        <a:xfrm>
+          <a:off x="0" y="0"/>
+          <a:ext cx="0" cy="0"/>
+          <a:chOff x="0" y="0"/>
+          <a:chExt cx="0" cy="0"/>
+        </a:xfrm>
+      </p:grpSpPr>
+      <p:sp>
+        <p:nvSpPr>
+          <p:cNvPr id="1146" name="Google Shape;1146;p53"/>
+          <p:cNvSpPr txBox="1">
+            <a:spLocks noGrp="1"/>
+          </p:cNvSpPr>
+          <p:nvPr>
+            <p:ph type="title"/>
+          </p:nvPr>
+        </p:nvSpPr>
+        <p:spPr>
+          <a:xfrm>
+            <a:off x="1691680" y="267494"/>
+            <a:ext cx="5040560" cy="647700"/>
+          </a:xfrm>
+          <a:prstGeom prst="rect">
+            <a:avLst/>
+          </a:prstGeom>
+        </p:spPr>
+        <p:txBody>
+          <a:bodyPr spcFirstLastPara="1" wrap="square" lIns="91425" tIns="91425" rIns="91425" bIns="91425" anchor="ctr" anchorCtr="0">
+            <a:noAutofit/>
+          </a:bodyPr>
+          <a:lstStyle/>
+          <a:p>
+            <a:pPr marL="0" lvl="0" indent="0" algn="l" rtl="0">
+              <a:spcBef>
+                <a:spcPts val="0"/>
+              </a:spcBef>
+              <a:spcAft>
+                <a:spcPts val="0"/>
+              </a:spcAft>
+              <a:buNone/>
+            </a:pPr>
+            <a:r>
+              <a:rPr lang="en" dirty="0" smtClean="0"/>
+              <a:t>Criação das Tabelas na 3FN</a:t>
+            </a:r>
+            <a:endParaRPr dirty="0"/>
+          </a:p>
+        </p:txBody>
+      </p:sp>
       <p:sp>
         <p:nvSpPr>
           <p:cNvPr id="11" name="Google Shape;1146;p53"/>
@@ -26022,7 +27074,7 @@
 </p:sld>
 </file>
 
-<file path=ppt/slides/slide16.xml><?xml version="1.0" encoding="utf-8"?>
+<file path=ppt/slides/slide17.xml><?xml version="1.0" encoding="utf-8"?>
 <p:sld xmlns:a="http://schemas.openxmlformats.org/drawingml/2006/main" xmlns:r="http://schemas.openxmlformats.org/officeDocument/2006/relationships" xmlns:p="http://schemas.openxmlformats.org/presentationml/2006/main">
   <p:cSld>
     <p:bg>
@@ -26412,412 +27464,6 @@
     <p:extLst>
       <p:ext uri="{BB962C8B-B14F-4D97-AF65-F5344CB8AC3E}">
         <p14:creationId xmlns:p14="http://schemas.microsoft.com/office/powerpoint/2010/main" val="3545480701"/>
-      </p:ext>
-    </p:extLst>
-  </p:cSld>
-  <p:clrMapOvr>
-    <a:masterClrMapping/>
-  </p:clrMapOvr>
-  <p:timing>
-    <p:tnLst>
-      <p:par>
-        <p:cTn id="1" dur="indefinite" restart="never" nodeType="tmRoot"/>
-      </p:par>
-    </p:tnLst>
-  </p:timing>
-</p:sld>
-</file>
-
-<file path=ppt/slides/slide17.xml><?xml version="1.0" encoding="utf-8"?>
-<p:sld xmlns:a="http://schemas.openxmlformats.org/drawingml/2006/main" xmlns:r="http://schemas.openxmlformats.org/officeDocument/2006/relationships" xmlns:p="http://schemas.openxmlformats.org/presentationml/2006/main">
-  <p:cSld>
-    <p:bg>
-      <p:bgPr>
-        <a:gradFill>
-          <a:gsLst>
-            <a:gs pos="100000">
-              <a:schemeClr val="bg1">
-                <a:lumMod val="95000"/>
-              </a:schemeClr>
-            </a:gs>
-            <a:gs pos="95000">
-              <a:schemeClr val="tx2">
-                <a:lumMod val="20000"/>
-                <a:lumOff val="80000"/>
-              </a:schemeClr>
-            </a:gs>
-          </a:gsLst>
-          <a:lin ang="5400000" scaled="0"/>
-        </a:gradFill>
-        <a:effectLst/>
-      </p:bgPr>
-    </p:bg>
-    <p:spTree>
-      <p:nvGrpSpPr>
-        <p:cNvPr id="1" name="Shape 1144"/>
-        <p:cNvGrpSpPr/>
-        <p:nvPr/>
-      </p:nvGrpSpPr>
-      <p:grpSpPr>
-        <a:xfrm>
-          <a:off x="0" y="0"/>
-          <a:ext cx="0" cy="0"/>
-          <a:chOff x="0" y="0"/>
-          <a:chExt cx="0" cy="0"/>
-        </a:xfrm>
-      </p:grpSpPr>
-      <p:sp>
-        <p:nvSpPr>
-          <p:cNvPr id="11" name="Google Shape;1146;p53"/>
-          <p:cNvSpPr txBox="1">
-            <a:spLocks/>
-          </p:cNvSpPr>
-          <p:nvPr/>
-        </p:nvSpPr>
-        <p:spPr>
-          <a:xfrm>
-            <a:off x="467544" y="123478"/>
-            <a:ext cx="7704856" cy="647700"/>
-          </a:xfrm>
-          <a:prstGeom prst="rect">
-            <a:avLst/>
-          </a:prstGeom>
-          <a:solidFill>
-            <a:srgbClr val="FFD119"/>
-          </a:solidFill>
-          <a:ln>
-            <a:noFill/>
-          </a:ln>
-        </p:spPr>
-        <p:txBody>
-          <a:bodyPr spcFirstLastPara="1" wrap="square" lIns="91425" tIns="91425" rIns="91425" bIns="91425" anchor="ctr" anchorCtr="0">
-            <a:noAutofit/>
-          </a:bodyPr>
-          <a:lstStyle>
-            <a:defPPr marR="0" lvl="0" algn="l" rtl="0">
-              <a:lnSpc>
-                <a:spcPct val="100000"/>
-              </a:lnSpc>
-              <a:spcBef>
-                <a:spcPts val="0"/>
-              </a:spcBef>
-              <a:spcAft>
-                <a:spcPts val="0"/>
-              </a:spcAft>
-            </a:defPPr>
-            <a:lvl1pPr marR="0" lvl="0" algn="l" rtl="0">
-              <a:lnSpc>
-                <a:spcPct val="100000"/>
-              </a:lnSpc>
-              <a:spcBef>
-                <a:spcPts val="0"/>
-              </a:spcBef>
-              <a:spcAft>
-                <a:spcPts val="0"/>
-              </a:spcAft>
-              <a:buClr>
-                <a:srgbClr val="5C0B68"/>
-              </a:buClr>
-              <a:buSzPts val="2800"/>
-              <a:buFont typeface="Red Hat Text"/>
-              <a:buNone/>
-              <a:defRPr sz="2800" b="1" i="0" u="none" strike="noStrike" cap="none">
-                <a:solidFill>
-                  <a:srgbClr val="5C0B68"/>
-                </a:solidFill>
-                <a:latin typeface="Red Hat Text"/>
-                <a:ea typeface="Red Hat Text"/>
-                <a:cs typeface="Red Hat Text"/>
-                <a:sym typeface="Red Hat Text"/>
-              </a:defRPr>
-            </a:lvl1pPr>
-            <a:lvl2pPr marR="0" lvl="1" algn="ctr" rtl="0">
-              <a:lnSpc>
-                <a:spcPct val="100000"/>
-              </a:lnSpc>
-              <a:spcBef>
-                <a:spcPts val="0"/>
-              </a:spcBef>
-              <a:spcAft>
-                <a:spcPts val="0"/>
-              </a:spcAft>
-              <a:buClr>
-                <a:schemeClr val="dk1"/>
-              </a:buClr>
-              <a:buSzPts val="2800"/>
-              <a:buFont typeface="Red Hat Text"/>
-              <a:buNone/>
-              <a:defRPr sz="2800" b="1" i="0" u="none" strike="noStrike" cap="none">
-                <a:solidFill>
-                  <a:schemeClr val="dk1"/>
-                </a:solidFill>
-                <a:latin typeface="Red Hat Text"/>
-                <a:ea typeface="Red Hat Text"/>
-                <a:cs typeface="Red Hat Text"/>
-                <a:sym typeface="Red Hat Text"/>
-              </a:defRPr>
-            </a:lvl2pPr>
-            <a:lvl3pPr marR="0" lvl="2" algn="ctr" rtl="0">
-              <a:lnSpc>
-                <a:spcPct val="100000"/>
-              </a:lnSpc>
-              <a:spcBef>
-                <a:spcPts val="0"/>
-              </a:spcBef>
-              <a:spcAft>
-                <a:spcPts val="0"/>
-              </a:spcAft>
-              <a:buClr>
-                <a:schemeClr val="dk1"/>
-              </a:buClr>
-              <a:buSzPts val="2800"/>
-              <a:buFont typeface="Red Hat Text"/>
-              <a:buNone/>
-              <a:defRPr sz="2800" b="1" i="0" u="none" strike="noStrike" cap="none">
-                <a:solidFill>
-                  <a:schemeClr val="dk1"/>
-                </a:solidFill>
-                <a:latin typeface="Red Hat Text"/>
-                <a:ea typeface="Red Hat Text"/>
-                <a:cs typeface="Red Hat Text"/>
-                <a:sym typeface="Red Hat Text"/>
-              </a:defRPr>
-            </a:lvl3pPr>
-            <a:lvl4pPr marR="0" lvl="3" algn="ctr" rtl="0">
-              <a:lnSpc>
-                <a:spcPct val="100000"/>
-              </a:lnSpc>
-              <a:spcBef>
-                <a:spcPts val="0"/>
-              </a:spcBef>
-              <a:spcAft>
-                <a:spcPts val="0"/>
-              </a:spcAft>
-              <a:buClr>
-                <a:schemeClr val="dk1"/>
-              </a:buClr>
-              <a:buSzPts val="2800"/>
-              <a:buFont typeface="Red Hat Text"/>
-              <a:buNone/>
-              <a:defRPr sz="2800" b="1" i="0" u="none" strike="noStrike" cap="none">
-                <a:solidFill>
-                  <a:schemeClr val="dk1"/>
-                </a:solidFill>
-                <a:latin typeface="Red Hat Text"/>
-                <a:ea typeface="Red Hat Text"/>
-                <a:cs typeface="Red Hat Text"/>
-                <a:sym typeface="Red Hat Text"/>
-              </a:defRPr>
-            </a:lvl4pPr>
-            <a:lvl5pPr marR="0" lvl="4" algn="ctr" rtl="0">
-              <a:lnSpc>
-                <a:spcPct val="100000"/>
-              </a:lnSpc>
-              <a:spcBef>
-                <a:spcPts val="0"/>
-              </a:spcBef>
-              <a:spcAft>
-                <a:spcPts val="0"/>
-              </a:spcAft>
-              <a:buClr>
-                <a:schemeClr val="dk1"/>
-              </a:buClr>
-              <a:buSzPts val="2800"/>
-              <a:buFont typeface="Red Hat Text"/>
-              <a:buNone/>
-              <a:defRPr sz="2800" b="1" i="0" u="none" strike="noStrike" cap="none">
-                <a:solidFill>
-                  <a:schemeClr val="dk1"/>
-                </a:solidFill>
-                <a:latin typeface="Red Hat Text"/>
-                <a:ea typeface="Red Hat Text"/>
-                <a:cs typeface="Red Hat Text"/>
-                <a:sym typeface="Red Hat Text"/>
-              </a:defRPr>
-            </a:lvl5pPr>
-            <a:lvl6pPr marR="0" lvl="5" algn="ctr" rtl="0">
-              <a:lnSpc>
-                <a:spcPct val="100000"/>
-              </a:lnSpc>
-              <a:spcBef>
-                <a:spcPts val="0"/>
-              </a:spcBef>
-              <a:spcAft>
-                <a:spcPts val="0"/>
-              </a:spcAft>
-              <a:buClr>
-                <a:schemeClr val="dk1"/>
-              </a:buClr>
-              <a:buSzPts val="2800"/>
-              <a:buFont typeface="Red Hat Text"/>
-              <a:buNone/>
-              <a:defRPr sz="2800" b="1" i="0" u="none" strike="noStrike" cap="none">
-                <a:solidFill>
-                  <a:schemeClr val="dk1"/>
-                </a:solidFill>
-                <a:latin typeface="Red Hat Text"/>
-                <a:ea typeface="Red Hat Text"/>
-                <a:cs typeface="Red Hat Text"/>
-                <a:sym typeface="Red Hat Text"/>
-              </a:defRPr>
-            </a:lvl6pPr>
-            <a:lvl7pPr marR="0" lvl="6" algn="ctr" rtl="0">
-              <a:lnSpc>
-                <a:spcPct val="100000"/>
-              </a:lnSpc>
-              <a:spcBef>
-                <a:spcPts val="0"/>
-              </a:spcBef>
-              <a:spcAft>
-                <a:spcPts val="0"/>
-              </a:spcAft>
-              <a:buClr>
-                <a:schemeClr val="dk1"/>
-              </a:buClr>
-              <a:buSzPts val="2800"/>
-              <a:buFont typeface="Red Hat Text"/>
-              <a:buNone/>
-              <a:defRPr sz="2800" b="1" i="0" u="none" strike="noStrike" cap="none">
-                <a:solidFill>
-                  <a:schemeClr val="dk1"/>
-                </a:solidFill>
-                <a:latin typeface="Red Hat Text"/>
-                <a:ea typeface="Red Hat Text"/>
-                <a:cs typeface="Red Hat Text"/>
-                <a:sym typeface="Red Hat Text"/>
-              </a:defRPr>
-            </a:lvl7pPr>
-            <a:lvl8pPr marR="0" lvl="7" algn="ctr" rtl="0">
-              <a:lnSpc>
-                <a:spcPct val="100000"/>
-              </a:lnSpc>
-              <a:spcBef>
-                <a:spcPts val="0"/>
-              </a:spcBef>
-              <a:spcAft>
-                <a:spcPts val="0"/>
-              </a:spcAft>
-              <a:buClr>
-                <a:schemeClr val="dk1"/>
-              </a:buClr>
-              <a:buSzPts val="2800"/>
-              <a:buFont typeface="Red Hat Text"/>
-              <a:buNone/>
-              <a:defRPr sz="2800" b="1" i="0" u="none" strike="noStrike" cap="none">
-                <a:solidFill>
-                  <a:schemeClr val="dk1"/>
-                </a:solidFill>
-                <a:latin typeface="Red Hat Text"/>
-                <a:ea typeface="Red Hat Text"/>
-                <a:cs typeface="Red Hat Text"/>
-                <a:sym typeface="Red Hat Text"/>
-              </a:defRPr>
-            </a:lvl8pPr>
-            <a:lvl9pPr marR="0" lvl="8" algn="ctr" rtl="0">
-              <a:lnSpc>
-                <a:spcPct val="100000"/>
-              </a:lnSpc>
-              <a:spcBef>
-                <a:spcPts val="0"/>
-              </a:spcBef>
-              <a:spcAft>
-                <a:spcPts val="0"/>
-              </a:spcAft>
-              <a:buClr>
-                <a:schemeClr val="dk1"/>
-              </a:buClr>
-              <a:buSzPts val="2800"/>
-              <a:buFont typeface="Red Hat Text"/>
-              <a:buNone/>
-              <a:defRPr sz="2800" b="1" i="0" u="none" strike="noStrike" cap="none">
-                <a:solidFill>
-                  <a:schemeClr val="dk1"/>
-                </a:solidFill>
-                <a:latin typeface="Red Hat Text"/>
-                <a:ea typeface="Red Hat Text"/>
-                <a:cs typeface="Red Hat Text"/>
-                <a:sym typeface="Red Hat Text"/>
-              </a:defRPr>
-            </a:lvl9pPr>
-          </a:lstStyle>
-          <a:p>
-            <a:pPr algn="ctr"/>
-            <a:r>
-              <a:rPr lang="pt-BR" sz="2000" dirty="0" smtClean="0"/>
-              <a:t>Consulta Simples na Tabela Produtos (MySql Workbench)</a:t>
-            </a:r>
-            <a:endParaRPr lang="pt-BR" sz="2000" dirty="0"/>
-          </a:p>
-        </p:txBody>
-      </p:sp>
-      <p:pic>
-        <p:nvPicPr>
-          <p:cNvPr id="6146" name="Picture 2"/>
-          <p:cNvPicPr>
-            <a:picLocks noChangeAspect="1" noChangeArrowheads="1"/>
-          </p:cNvPicPr>
-          <p:nvPr/>
-        </p:nvPicPr>
-        <p:blipFill>
-          <a:blip r:embed="rId3">
-            <a:extLst>
-              <a:ext uri="{28A0092B-C50C-407E-A947-70E740481C1C}">
-                <a14:useLocalDpi xmlns:a14="http://schemas.microsoft.com/office/drawing/2010/main" val="0"/>
-              </a:ext>
-            </a:extLst>
-          </a:blip>
-          <a:srcRect/>
-          <a:stretch>
-            <a:fillRect/>
-          </a:stretch>
-        </p:blipFill>
-        <p:spPr bwMode="auto">
-          <a:xfrm>
-            <a:off x="179512" y="915566"/>
-            <a:ext cx="8856983" cy="4104456"/>
-          </a:xfrm>
-          <a:prstGeom prst="rect">
-            <a:avLst/>
-          </a:prstGeom>
-          <a:noFill/>
-          <a:ln>
-            <a:noFill/>
-          </a:ln>
-          <a:effectLst/>
-          <a:extLst>
-            <a:ext uri="{909E8E84-426E-40DD-AFC4-6F175D3DCCD1}">
-              <a14:hiddenFill xmlns:a14="http://schemas.microsoft.com/office/drawing/2010/main">
-                <a:solidFill>
-                  <a:schemeClr val="accent1"/>
-                </a:solidFill>
-              </a14:hiddenFill>
-            </a:ext>
-            <a:ext uri="{91240B29-F687-4F45-9708-019B960494DF}">
-              <a14:hiddenLine xmlns:a14="http://schemas.microsoft.com/office/drawing/2010/main" w="9525">
-                <a:solidFill>
-                  <a:schemeClr val="tx1"/>
-                </a:solidFill>
-                <a:miter lim="800000"/>
-                <a:headEnd/>
-                <a:tailEnd/>
-              </a14:hiddenLine>
-            </a:ext>
-            <a:ext uri="{AF507438-7753-43E0-B8FC-AC1667EBCBE1}">
-              <a14:hiddenEffects xmlns:a14="http://schemas.microsoft.com/office/drawing/2010/main">
-                <a:effectLst>
-                  <a:outerShdw dist="35921" dir="2700000" algn="ctr" rotWithShape="0">
-                    <a:schemeClr val="bg2"/>
-                  </a:outerShdw>
-                </a:effectLst>
-              </a14:hiddenEffects>
-            </a:ext>
-          </a:extLst>
-        </p:spPr>
-      </p:pic>
-    </p:spTree>
-    <p:extLst>
-      <p:ext uri="{BB962C8B-B14F-4D97-AF65-F5344CB8AC3E}">
-        <p14:creationId xmlns:p14="http://schemas.microsoft.com/office/powerpoint/2010/main" val="2508116876"/>
       </p:ext>
     </p:extLst>
   </p:cSld>
@@ -27150,7 +27796,7 @@
             <a:pPr algn="ctr"/>
             <a:r>
               <a:rPr lang="pt-BR" sz="2000" dirty="0" smtClean="0"/>
-              <a:t>Consulta Simples na Tabela Pedidos (MySql Workbench)</a:t>
+              <a:t>Consulta Simples na Tabela Produtos (MySql Workbench)</a:t>
             </a:r>
             <a:endParaRPr lang="pt-BR" sz="2000" dirty="0"/>
           </a:p>
@@ -27158,7 +27804,7 @@
       </p:sp>
       <p:pic>
         <p:nvPicPr>
-          <p:cNvPr id="7170" name="Picture 2"/>
+          <p:cNvPr id="6146" name="Picture 2"/>
           <p:cNvPicPr>
             <a:picLocks noChangeAspect="1" noChangeArrowheads="1"/>
           </p:cNvPicPr>
@@ -27179,8 +27825,8 @@
         </p:blipFill>
         <p:spPr bwMode="auto">
           <a:xfrm>
-            <a:off x="467544" y="771178"/>
-            <a:ext cx="7704855" cy="4190308"/>
+            <a:off x="179512" y="915566"/>
+            <a:ext cx="8856983" cy="4104456"/>
           </a:xfrm>
           <a:prstGeom prst="rect">
             <a:avLst/>
@@ -27223,7 +27869,7 @@
     </p:spTree>
     <p:extLst>
       <p:ext uri="{BB962C8B-B14F-4D97-AF65-F5344CB8AC3E}">
-        <p14:creationId xmlns:p14="http://schemas.microsoft.com/office/powerpoint/2010/main" val="3318859326"/>
+        <p14:creationId xmlns:p14="http://schemas.microsoft.com/office/powerpoint/2010/main" val="2508116876"/>
       </p:ext>
     </p:extLst>
   </p:cSld>
@@ -27288,8 +27934,8 @@
         </p:nvSpPr>
         <p:spPr>
           <a:xfrm>
-            <a:off x="179512" y="123478"/>
-            <a:ext cx="8568952" cy="936104"/>
+            <a:off x="467544" y="123478"/>
+            <a:ext cx="7704856" cy="647700"/>
           </a:xfrm>
           <a:prstGeom prst="rect">
             <a:avLst/>
@@ -27556,23 +28202,7 @@
             <a:pPr algn="ctr"/>
             <a:r>
               <a:rPr lang="pt-BR" sz="2000" dirty="0" smtClean="0"/>
-              <a:t>Consulta na tabela Clientes envolvendo Junção das tabelas </a:t>
-            </a:r>
-            <a:r>
-              <a:rPr lang="pt-BR" sz="2000" dirty="0"/>
-              <a:t>Clientes, </a:t>
-            </a:r>
-            <a:r>
-              <a:rPr lang="pt-BR" sz="2000" dirty="0" smtClean="0"/>
-              <a:t> Pedidos, Itens do pedido </a:t>
-            </a:r>
-            <a:r>
-              <a:rPr lang="pt-BR" sz="2000" dirty="0"/>
-              <a:t>e </a:t>
-            </a:r>
-            <a:r>
-              <a:rPr lang="pt-BR" sz="2000" dirty="0" smtClean="0"/>
-              <a:t>telefones  (MySql Workbench)</a:t>
+              <a:t>Consulta Simples na Tabela Pedidos (MySql Workbench)</a:t>
             </a:r>
             <a:endParaRPr lang="pt-BR" sz="2000" dirty="0"/>
           </a:p>
@@ -27580,7 +28210,7 @@
       </p:sp>
       <p:pic>
         <p:nvPicPr>
-          <p:cNvPr id="8194" name="Picture 2"/>
+          <p:cNvPr id="7170" name="Picture 2"/>
           <p:cNvPicPr>
             <a:picLocks noChangeAspect="1" noChangeArrowheads="1"/>
           </p:cNvPicPr>
@@ -27601,8 +28231,8 @@
         </p:blipFill>
         <p:spPr bwMode="auto">
           <a:xfrm>
-            <a:off x="192746" y="1059582"/>
-            <a:ext cx="8555718" cy="3933825"/>
+            <a:off x="467544" y="771178"/>
+            <a:ext cx="7704855" cy="4190308"/>
           </a:xfrm>
           <a:prstGeom prst="rect">
             <a:avLst/>
@@ -27645,7 +28275,7 @@
     </p:spTree>
     <p:extLst>
       <p:ext uri="{BB962C8B-B14F-4D97-AF65-F5344CB8AC3E}">
-        <p14:creationId xmlns:p14="http://schemas.microsoft.com/office/powerpoint/2010/main" val="3911961522"/>
+        <p14:creationId xmlns:p14="http://schemas.microsoft.com/office/powerpoint/2010/main" val="3318859326"/>
       </p:ext>
     </p:extLst>
   </p:cSld>
@@ -28169,6 +28799,846 @@
         </p:nvSpPr>
         <p:spPr>
           <a:xfrm>
+            <a:off x="467544" y="123478"/>
+            <a:ext cx="7704856" cy="647700"/>
+          </a:xfrm>
+          <a:prstGeom prst="rect">
+            <a:avLst/>
+          </a:prstGeom>
+          <a:solidFill>
+            <a:srgbClr val="FFD119"/>
+          </a:solidFill>
+          <a:ln>
+            <a:noFill/>
+          </a:ln>
+        </p:spPr>
+        <p:txBody>
+          <a:bodyPr spcFirstLastPara="1" wrap="square" lIns="91425" tIns="91425" rIns="91425" bIns="91425" anchor="ctr" anchorCtr="0">
+            <a:noAutofit/>
+          </a:bodyPr>
+          <a:lstStyle>
+            <a:defPPr marR="0" lvl="0" algn="l" rtl="0">
+              <a:lnSpc>
+                <a:spcPct val="100000"/>
+              </a:lnSpc>
+              <a:spcBef>
+                <a:spcPts val="0"/>
+              </a:spcBef>
+              <a:spcAft>
+                <a:spcPts val="0"/>
+              </a:spcAft>
+            </a:defPPr>
+            <a:lvl1pPr marR="0" lvl="0" algn="l" rtl="0">
+              <a:lnSpc>
+                <a:spcPct val="100000"/>
+              </a:lnSpc>
+              <a:spcBef>
+                <a:spcPts val="0"/>
+              </a:spcBef>
+              <a:spcAft>
+                <a:spcPts val="0"/>
+              </a:spcAft>
+              <a:buClr>
+                <a:srgbClr val="5C0B68"/>
+              </a:buClr>
+              <a:buSzPts val="2800"/>
+              <a:buFont typeface="Red Hat Text"/>
+              <a:buNone/>
+              <a:defRPr sz="2800" b="1" i="0" u="none" strike="noStrike" cap="none">
+                <a:solidFill>
+                  <a:srgbClr val="5C0B68"/>
+                </a:solidFill>
+                <a:latin typeface="Red Hat Text"/>
+                <a:ea typeface="Red Hat Text"/>
+                <a:cs typeface="Red Hat Text"/>
+                <a:sym typeface="Red Hat Text"/>
+              </a:defRPr>
+            </a:lvl1pPr>
+            <a:lvl2pPr marR="0" lvl="1" algn="ctr" rtl="0">
+              <a:lnSpc>
+                <a:spcPct val="100000"/>
+              </a:lnSpc>
+              <a:spcBef>
+                <a:spcPts val="0"/>
+              </a:spcBef>
+              <a:spcAft>
+                <a:spcPts val="0"/>
+              </a:spcAft>
+              <a:buClr>
+                <a:schemeClr val="dk1"/>
+              </a:buClr>
+              <a:buSzPts val="2800"/>
+              <a:buFont typeface="Red Hat Text"/>
+              <a:buNone/>
+              <a:defRPr sz="2800" b="1" i="0" u="none" strike="noStrike" cap="none">
+                <a:solidFill>
+                  <a:schemeClr val="dk1"/>
+                </a:solidFill>
+                <a:latin typeface="Red Hat Text"/>
+                <a:ea typeface="Red Hat Text"/>
+                <a:cs typeface="Red Hat Text"/>
+                <a:sym typeface="Red Hat Text"/>
+              </a:defRPr>
+            </a:lvl2pPr>
+            <a:lvl3pPr marR="0" lvl="2" algn="ctr" rtl="0">
+              <a:lnSpc>
+                <a:spcPct val="100000"/>
+              </a:lnSpc>
+              <a:spcBef>
+                <a:spcPts val="0"/>
+              </a:spcBef>
+              <a:spcAft>
+                <a:spcPts val="0"/>
+              </a:spcAft>
+              <a:buClr>
+                <a:schemeClr val="dk1"/>
+              </a:buClr>
+              <a:buSzPts val="2800"/>
+              <a:buFont typeface="Red Hat Text"/>
+              <a:buNone/>
+              <a:defRPr sz="2800" b="1" i="0" u="none" strike="noStrike" cap="none">
+                <a:solidFill>
+                  <a:schemeClr val="dk1"/>
+                </a:solidFill>
+                <a:latin typeface="Red Hat Text"/>
+                <a:ea typeface="Red Hat Text"/>
+                <a:cs typeface="Red Hat Text"/>
+                <a:sym typeface="Red Hat Text"/>
+              </a:defRPr>
+            </a:lvl3pPr>
+            <a:lvl4pPr marR="0" lvl="3" algn="ctr" rtl="0">
+              <a:lnSpc>
+                <a:spcPct val="100000"/>
+              </a:lnSpc>
+              <a:spcBef>
+                <a:spcPts val="0"/>
+              </a:spcBef>
+              <a:spcAft>
+                <a:spcPts val="0"/>
+              </a:spcAft>
+              <a:buClr>
+                <a:schemeClr val="dk1"/>
+              </a:buClr>
+              <a:buSzPts val="2800"/>
+              <a:buFont typeface="Red Hat Text"/>
+              <a:buNone/>
+              <a:defRPr sz="2800" b="1" i="0" u="none" strike="noStrike" cap="none">
+                <a:solidFill>
+                  <a:schemeClr val="dk1"/>
+                </a:solidFill>
+                <a:latin typeface="Red Hat Text"/>
+                <a:ea typeface="Red Hat Text"/>
+                <a:cs typeface="Red Hat Text"/>
+                <a:sym typeface="Red Hat Text"/>
+              </a:defRPr>
+            </a:lvl4pPr>
+            <a:lvl5pPr marR="0" lvl="4" algn="ctr" rtl="0">
+              <a:lnSpc>
+                <a:spcPct val="100000"/>
+              </a:lnSpc>
+              <a:spcBef>
+                <a:spcPts val="0"/>
+              </a:spcBef>
+              <a:spcAft>
+                <a:spcPts val="0"/>
+              </a:spcAft>
+              <a:buClr>
+                <a:schemeClr val="dk1"/>
+              </a:buClr>
+              <a:buSzPts val="2800"/>
+              <a:buFont typeface="Red Hat Text"/>
+              <a:buNone/>
+              <a:defRPr sz="2800" b="1" i="0" u="none" strike="noStrike" cap="none">
+                <a:solidFill>
+                  <a:schemeClr val="dk1"/>
+                </a:solidFill>
+                <a:latin typeface="Red Hat Text"/>
+                <a:ea typeface="Red Hat Text"/>
+                <a:cs typeface="Red Hat Text"/>
+                <a:sym typeface="Red Hat Text"/>
+              </a:defRPr>
+            </a:lvl5pPr>
+            <a:lvl6pPr marR="0" lvl="5" algn="ctr" rtl="0">
+              <a:lnSpc>
+                <a:spcPct val="100000"/>
+              </a:lnSpc>
+              <a:spcBef>
+                <a:spcPts val="0"/>
+              </a:spcBef>
+              <a:spcAft>
+                <a:spcPts val="0"/>
+              </a:spcAft>
+              <a:buClr>
+                <a:schemeClr val="dk1"/>
+              </a:buClr>
+              <a:buSzPts val="2800"/>
+              <a:buFont typeface="Red Hat Text"/>
+              <a:buNone/>
+              <a:defRPr sz="2800" b="1" i="0" u="none" strike="noStrike" cap="none">
+                <a:solidFill>
+                  <a:schemeClr val="dk1"/>
+                </a:solidFill>
+                <a:latin typeface="Red Hat Text"/>
+                <a:ea typeface="Red Hat Text"/>
+                <a:cs typeface="Red Hat Text"/>
+                <a:sym typeface="Red Hat Text"/>
+              </a:defRPr>
+            </a:lvl6pPr>
+            <a:lvl7pPr marR="0" lvl="6" algn="ctr" rtl="0">
+              <a:lnSpc>
+                <a:spcPct val="100000"/>
+              </a:lnSpc>
+              <a:spcBef>
+                <a:spcPts val="0"/>
+              </a:spcBef>
+              <a:spcAft>
+                <a:spcPts val="0"/>
+              </a:spcAft>
+              <a:buClr>
+                <a:schemeClr val="dk1"/>
+              </a:buClr>
+              <a:buSzPts val="2800"/>
+              <a:buFont typeface="Red Hat Text"/>
+              <a:buNone/>
+              <a:defRPr sz="2800" b="1" i="0" u="none" strike="noStrike" cap="none">
+                <a:solidFill>
+                  <a:schemeClr val="dk1"/>
+                </a:solidFill>
+                <a:latin typeface="Red Hat Text"/>
+                <a:ea typeface="Red Hat Text"/>
+                <a:cs typeface="Red Hat Text"/>
+                <a:sym typeface="Red Hat Text"/>
+              </a:defRPr>
+            </a:lvl7pPr>
+            <a:lvl8pPr marR="0" lvl="7" algn="ctr" rtl="0">
+              <a:lnSpc>
+                <a:spcPct val="100000"/>
+              </a:lnSpc>
+              <a:spcBef>
+                <a:spcPts val="0"/>
+              </a:spcBef>
+              <a:spcAft>
+                <a:spcPts val="0"/>
+              </a:spcAft>
+              <a:buClr>
+                <a:schemeClr val="dk1"/>
+              </a:buClr>
+              <a:buSzPts val="2800"/>
+              <a:buFont typeface="Red Hat Text"/>
+              <a:buNone/>
+              <a:defRPr sz="2800" b="1" i="0" u="none" strike="noStrike" cap="none">
+                <a:solidFill>
+                  <a:schemeClr val="dk1"/>
+                </a:solidFill>
+                <a:latin typeface="Red Hat Text"/>
+                <a:ea typeface="Red Hat Text"/>
+                <a:cs typeface="Red Hat Text"/>
+                <a:sym typeface="Red Hat Text"/>
+              </a:defRPr>
+            </a:lvl8pPr>
+            <a:lvl9pPr marR="0" lvl="8" algn="ctr" rtl="0">
+              <a:lnSpc>
+                <a:spcPct val="100000"/>
+              </a:lnSpc>
+              <a:spcBef>
+                <a:spcPts val="0"/>
+              </a:spcBef>
+              <a:spcAft>
+                <a:spcPts val="0"/>
+              </a:spcAft>
+              <a:buClr>
+                <a:schemeClr val="dk1"/>
+              </a:buClr>
+              <a:buSzPts val="2800"/>
+              <a:buFont typeface="Red Hat Text"/>
+              <a:buNone/>
+              <a:defRPr sz="2800" b="1" i="0" u="none" strike="noStrike" cap="none">
+                <a:solidFill>
+                  <a:schemeClr val="dk1"/>
+                </a:solidFill>
+                <a:latin typeface="Red Hat Text"/>
+                <a:ea typeface="Red Hat Text"/>
+                <a:cs typeface="Red Hat Text"/>
+                <a:sym typeface="Red Hat Text"/>
+              </a:defRPr>
+            </a:lvl9pPr>
+          </a:lstStyle>
+          <a:p>
+            <a:pPr algn="ctr"/>
+            <a:r>
+              <a:rPr lang="pt-BR" sz="2000" dirty="0" smtClean="0"/>
+              <a:t>Consulta Simples na Tabela </a:t>
+            </a:r>
+            <a:r>
+              <a:rPr lang="pt-BR" sz="2000" dirty="0" smtClean="0"/>
+              <a:t>Usuários</a:t>
+            </a:r>
+            <a:r>
+              <a:rPr lang="pt-BR" sz="2000" dirty="0" smtClean="0"/>
+              <a:t> </a:t>
+            </a:r>
+            <a:r>
+              <a:rPr lang="pt-BR" sz="2000" dirty="0" smtClean="0"/>
+              <a:t>(MySql Workbench)</a:t>
+            </a:r>
+            <a:endParaRPr lang="pt-BR" sz="2000" dirty="0"/>
+          </a:p>
+        </p:txBody>
+      </p:sp>
+      <p:pic>
+        <p:nvPicPr>
+          <p:cNvPr id="4098" name="Picture 2"/>
+          <p:cNvPicPr>
+            <a:picLocks noChangeAspect="1" noChangeArrowheads="1"/>
+          </p:cNvPicPr>
+          <p:nvPr/>
+        </p:nvPicPr>
+        <p:blipFill>
+          <a:blip r:embed="rId3">
+            <a:extLst>
+              <a:ext uri="{28A0092B-C50C-407E-A947-70E740481C1C}">
+                <a14:useLocalDpi xmlns:a14="http://schemas.microsoft.com/office/drawing/2010/main" val="0"/>
+              </a:ext>
+            </a:extLst>
+          </a:blip>
+          <a:srcRect/>
+          <a:stretch>
+            <a:fillRect/>
+          </a:stretch>
+        </p:blipFill>
+        <p:spPr bwMode="auto">
+          <a:xfrm>
+            <a:off x="165485" y="797875"/>
+            <a:ext cx="8438963" cy="4097622"/>
+          </a:xfrm>
+          <a:prstGeom prst="rect">
+            <a:avLst/>
+          </a:prstGeom>
+          <a:noFill/>
+          <a:ln>
+            <a:noFill/>
+          </a:ln>
+          <a:effectLst/>
+          <a:extLst>
+            <a:ext uri="{909E8E84-426E-40DD-AFC4-6F175D3DCCD1}">
+              <a14:hiddenFill xmlns:a14="http://schemas.microsoft.com/office/drawing/2010/main">
+                <a:solidFill>
+                  <a:schemeClr val="accent1"/>
+                </a:solidFill>
+              </a14:hiddenFill>
+            </a:ext>
+            <a:ext uri="{91240B29-F687-4F45-9708-019B960494DF}">
+              <a14:hiddenLine xmlns:a14="http://schemas.microsoft.com/office/drawing/2010/main" w="9525">
+                <a:solidFill>
+                  <a:schemeClr val="tx1"/>
+                </a:solidFill>
+                <a:miter lim="800000"/>
+                <a:headEnd/>
+                <a:tailEnd/>
+              </a14:hiddenLine>
+            </a:ext>
+            <a:ext uri="{AF507438-7753-43E0-B8FC-AC1667EBCBE1}">
+              <a14:hiddenEffects xmlns:a14="http://schemas.microsoft.com/office/drawing/2010/main">
+                <a:effectLst>
+                  <a:outerShdw dist="35921" dir="2700000" algn="ctr" rotWithShape="0">
+                    <a:schemeClr val="bg2"/>
+                  </a:outerShdw>
+                </a:effectLst>
+              </a14:hiddenEffects>
+            </a:ext>
+          </a:extLst>
+        </p:spPr>
+      </p:pic>
+    </p:spTree>
+    <p:extLst>
+      <p:ext uri="{BB962C8B-B14F-4D97-AF65-F5344CB8AC3E}">
+        <p14:creationId xmlns:p14="http://schemas.microsoft.com/office/powerpoint/2010/main" val="2510565515"/>
+      </p:ext>
+    </p:extLst>
+  </p:cSld>
+  <p:clrMapOvr>
+    <a:masterClrMapping/>
+  </p:clrMapOvr>
+  <p:timing>
+    <p:tnLst>
+      <p:par>
+        <p:cTn id="1" dur="indefinite" restart="never" nodeType="tmRoot"/>
+      </p:par>
+    </p:tnLst>
+  </p:timing>
+</p:sld>
+</file>
+
+<file path=ppt/slides/slide21.xml><?xml version="1.0" encoding="utf-8"?>
+<p:sld xmlns:a="http://schemas.openxmlformats.org/drawingml/2006/main" xmlns:r="http://schemas.openxmlformats.org/officeDocument/2006/relationships" xmlns:p="http://schemas.openxmlformats.org/presentationml/2006/main">
+  <p:cSld>
+    <p:bg>
+      <p:bgPr>
+        <a:gradFill>
+          <a:gsLst>
+            <a:gs pos="100000">
+              <a:schemeClr val="bg1">
+                <a:lumMod val="95000"/>
+              </a:schemeClr>
+            </a:gs>
+            <a:gs pos="95000">
+              <a:schemeClr val="tx2">
+                <a:lumMod val="20000"/>
+                <a:lumOff val="80000"/>
+              </a:schemeClr>
+            </a:gs>
+          </a:gsLst>
+          <a:lin ang="5400000" scaled="0"/>
+        </a:gradFill>
+        <a:effectLst/>
+      </p:bgPr>
+    </p:bg>
+    <p:spTree>
+      <p:nvGrpSpPr>
+        <p:cNvPr id="1" name="Shape 1144"/>
+        <p:cNvGrpSpPr/>
+        <p:nvPr/>
+      </p:nvGrpSpPr>
+      <p:grpSpPr>
+        <a:xfrm>
+          <a:off x="0" y="0"/>
+          <a:ext cx="0" cy="0"/>
+          <a:chOff x="0" y="0"/>
+          <a:chExt cx="0" cy="0"/>
+        </a:xfrm>
+      </p:grpSpPr>
+      <p:sp>
+        <p:nvSpPr>
+          <p:cNvPr id="11" name="Google Shape;1146;p53"/>
+          <p:cNvSpPr txBox="1">
+            <a:spLocks/>
+          </p:cNvSpPr>
+          <p:nvPr/>
+        </p:nvSpPr>
+        <p:spPr>
+          <a:xfrm>
+            <a:off x="179512" y="123478"/>
+            <a:ext cx="8568952" cy="936104"/>
+          </a:xfrm>
+          <a:prstGeom prst="rect">
+            <a:avLst/>
+          </a:prstGeom>
+          <a:solidFill>
+            <a:srgbClr val="FFD119"/>
+          </a:solidFill>
+          <a:ln>
+            <a:noFill/>
+          </a:ln>
+        </p:spPr>
+        <p:txBody>
+          <a:bodyPr spcFirstLastPara="1" wrap="square" lIns="91425" tIns="91425" rIns="91425" bIns="91425" anchor="ctr" anchorCtr="0">
+            <a:noAutofit/>
+          </a:bodyPr>
+          <a:lstStyle>
+            <a:defPPr marR="0" lvl="0" algn="l" rtl="0">
+              <a:lnSpc>
+                <a:spcPct val="100000"/>
+              </a:lnSpc>
+              <a:spcBef>
+                <a:spcPts val="0"/>
+              </a:spcBef>
+              <a:spcAft>
+                <a:spcPts val="0"/>
+              </a:spcAft>
+            </a:defPPr>
+            <a:lvl1pPr marR="0" lvl="0" algn="l" rtl="0">
+              <a:lnSpc>
+                <a:spcPct val="100000"/>
+              </a:lnSpc>
+              <a:spcBef>
+                <a:spcPts val="0"/>
+              </a:spcBef>
+              <a:spcAft>
+                <a:spcPts val="0"/>
+              </a:spcAft>
+              <a:buClr>
+                <a:srgbClr val="5C0B68"/>
+              </a:buClr>
+              <a:buSzPts val="2800"/>
+              <a:buFont typeface="Red Hat Text"/>
+              <a:buNone/>
+              <a:defRPr sz="2800" b="1" i="0" u="none" strike="noStrike" cap="none">
+                <a:solidFill>
+                  <a:srgbClr val="5C0B68"/>
+                </a:solidFill>
+                <a:latin typeface="Red Hat Text"/>
+                <a:ea typeface="Red Hat Text"/>
+                <a:cs typeface="Red Hat Text"/>
+                <a:sym typeface="Red Hat Text"/>
+              </a:defRPr>
+            </a:lvl1pPr>
+            <a:lvl2pPr marR="0" lvl="1" algn="ctr" rtl="0">
+              <a:lnSpc>
+                <a:spcPct val="100000"/>
+              </a:lnSpc>
+              <a:spcBef>
+                <a:spcPts val="0"/>
+              </a:spcBef>
+              <a:spcAft>
+                <a:spcPts val="0"/>
+              </a:spcAft>
+              <a:buClr>
+                <a:schemeClr val="dk1"/>
+              </a:buClr>
+              <a:buSzPts val="2800"/>
+              <a:buFont typeface="Red Hat Text"/>
+              <a:buNone/>
+              <a:defRPr sz="2800" b="1" i="0" u="none" strike="noStrike" cap="none">
+                <a:solidFill>
+                  <a:schemeClr val="dk1"/>
+                </a:solidFill>
+                <a:latin typeface="Red Hat Text"/>
+                <a:ea typeface="Red Hat Text"/>
+                <a:cs typeface="Red Hat Text"/>
+                <a:sym typeface="Red Hat Text"/>
+              </a:defRPr>
+            </a:lvl2pPr>
+            <a:lvl3pPr marR="0" lvl="2" algn="ctr" rtl="0">
+              <a:lnSpc>
+                <a:spcPct val="100000"/>
+              </a:lnSpc>
+              <a:spcBef>
+                <a:spcPts val="0"/>
+              </a:spcBef>
+              <a:spcAft>
+                <a:spcPts val="0"/>
+              </a:spcAft>
+              <a:buClr>
+                <a:schemeClr val="dk1"/>
+              </a:buClr>
+              <a:buSzPts val="2800"/>
+              <a:buFont typeface="Red Hat Text"/>
+              <a:buNone/>
+              <a:defRPr sz="2800" b="1" i="0" u="none" strike="noStrike" cap="none">
+                <a:solidFill>
+                  <a:schemeClr val="dk1"/>
+                </a:solidFill>
+                <a:latin typeface="Red Hat Text"/>
+                <a:ea typeface="Red Hat Text"/>
+                <a:cs typeface="Red Hat Text"/>
+                <a:sym typeface="Red Hat Text"/>
+              </a:defRPr>
+            </a:lvl3pPr>
+            <a:lvl4pPr marR="0" lvl="3" algn="ctr" rtl="0">
+              <a:lnSpc>
+                <a:spcPct val="100000"/>
+              </a:lnSpc>
+              <a:spcBef>
+                <a:spcPts val="0"/>
+              </a:spcBef>
+              <a:spcAft>
+                <a:spcPts val="0"/>
+              </a:spcAft>
+              <a:buClr>
+                <a:schemeClr val="dk1"/>
+              </a:buClr>
+              <a:buSzPts val="2800"/>
+              <a:buFont typeface="Red Hat Text"/>
+              <a:buNone/>
+              <a:defRPr sz="2800" b="1" i="0" u="none" strike="noStrike" cap="none">
+                <a:solidFill>
+                  <a:schemeClr val="dk1"/>
+                </a:solidFill>
+                <a:latin typeface="Red Hat Text"/>
+                <a:ea typeface="Red Hat Text"/>
+                <a:cs typeface="Red Hat Text"/>
+                <a:sym typeface="Red Hat Text"/>
+              </a:defRPr>
+            </a:lvl4pPr>
+            <a:lvl5pPr marR="0" lvl="4" algn="ctr" rtl="0">
+              <a:lnSpc>
+                <a:spcPct val="100000"/>
+              </a:lnSpc>
+              <a:spcBef>
+                <a:spcPts val="0"/>
+              </a:spcBef>
+              <a:spcAft>
+                <a:spcPts val="0"/>
+              </a:spcAft>
+              <a:buClr>
+                <a:schemeClr val="dk1"/>
+              </a:buClr>
+              <a:buSzPts val="2800"/>
+              <a:buFont typeface="Red Hat Text"/>
+              <a:buNone/>
+              <a:defRPr sz="2800" b="1" i="0" u="none" strike="noStrike" cap="none">
+                <a:solidFill>
+                  <a:schemeClr val="dk1"/>
+                </a:solidFill>
+                <a:latin typeface="Red Hat Text"/>
+                <a:ea typeface="Red Hat Text"/>
+                <a:cs typeface="Red Hat Text"/>
+                <a:sym typeface="Red Hat Text"/>
+              </a:defRPr>
+            </a:lvl5pPr>
+            <a:lvl6pPr marR="0" lvl="5" algn="ctr" rtl="0">
+              <a:lnSpc>
+                <a:spcPct val="100000"/>
+              </a:lnSpc>
+              <a:spcBef>
+                <a:spcPts val="0"/>
+              </a:spcBef>
+              <a:spcAft>
+                <a:spcPts val="0"/>
+              </a:spcAft>
+              <a:buClr>
+                <a:schemeClr val="dk1"/>
+              </a:buClr>
+              <a:buSzPts val="2800"/>
+              <a:buFont typeface="Red Hat Text"/>
+              <a:buNone/>
+              <a:defRPr sz="2800" b="1" i="0" u="none" strike="noStrike" cap="none">
+                <a:solidFill>
+                  <a:schemeClr val="dk1"/>
+                </a:solidFill>
+                <a:latin typeface="Red Hat Text"/>
+                <a:ea typeface="Red Hat Text"/>
+                <a:cs typeface="Red Hat Text"/>
+                <a:sym typeface="Red Hat Text"/>
+              </a:defRPr>
+            </a:lvl6pPr>
+            <a:lvl7pPr marR="0" lvl="6" algn="ctr" rtl="0">
+              <a:lnSpc>
+                <a:spcPct val="100000"/>
+              </a:lnSpc>
+              <a:spcBef>
+                <a:spcPts val="0"/>
+              </a:spcBef>
+              <a:spcAft>
+                <a:spcPts val="0"/>
+              </a:spcAft>
+              <a:buClr>
+                <a:schemeClr val="dk1"/>
+              </a:buClr>
+              <a:buSzPts val="2800"/>
+              <a:buFont typeface="Red Hat Text"/>
+              <a:buNone/>
+              <a:defRPr sz="2800" b="1" i="0" u="none" strike="noStrike" cap="none">
+                <a:solidFill>
+                  <a:schemeClr val="dk1"/>
+                </a:solidFill>
+                <a:latin typeface="Red Hat Text"/>
+                <a:ea typeface="Red Hat Text"/>
+                <a:cs typeface="Red Hat Text"/>
+                <a:sym typeface="Red Hat Text"/>
+              </a:defRPr>
+            </a:lvl7pPr>
+            <a:lvl8pPr marR="0" lvl="7" algn="ctr" rtl="0">
+              <a:lnSpc>
+                <a:spcPct val="100000"/>
+              </a:lnSpc>
+              <a:spcBef>
+                <a:spcPts val="0"/>
+              </a:spcBef>
+              <a:spcAft>
+                <a:spcPts val="0"/>
+              </a:spcAft>
+              <a:buClr>
+                <a:schemeClr val="dk1"/>
+              </a:buClr>
+              <a:buSzPts val="2800"/>
+              <a:buFont typeface="Red Hat Text"/>
+              <a:buNone/>
+              <a:defRPr sz="2800" b="1" i="0" u="none" strike="noStrike" cap="none">
+                <a:solidFill>
+                  <a:schemeClr val="dk1"/>
+                </a:solidFill>
+                <a:latin typeface="Red Hat Text"/>
+                <a:ea typeface="Red Hat Text"/>
+                <a:cs typeface="Red Hat Text"/>
+                <a:sym typeface="Red Hat Text"/>
+              </a:defRPr>
+            </a:lvl8pPr>
+            <a:lvl9pPr marR="0" lvl="8" algn="ctr" rtl="0">
+              <a:lnSpc>
+                <a:spcPct val="100000"/>
+              </a:lnSpc>
+              <a:spcBef>
+                <a:spcPts val="0"/>
+              </a:spcBef>
+              <a:spcAft>
+                <a:spcPts val="0"/>
+              </a:spcAft>
+              <a:buClr>
+                <a:schemeClr val="dk1"/>
+              </a:buClr>
+              <a:buSzPts val="2800"/>
+              <a:buFont typeface="Red Hat Text"/>
+              <a:buNone/>
+              <a:defRPr sz="2800" b="1" i="0" u="none" strike="noStrike" cap="none">
+                <a:solidFill>
+                  <a:schemeClr val="dk1"/>
+                </a:solidFill>
+                <a:latin typeface="Red Hat Text"/>
+                <a:ea typeface="Red Hat Text"/>
+                <a:cs typeface="Red Hat Text"/>
+                <a:sym typeface="Red Hat Text"/>
+              </a:defRPr>
+            </a:lvl9pPr>
+          </a:lstStyle>
+          <a:p>
+            <a:pPr algn="ctr"/>
+            <a:r>
+              <a:rPr lang="pt-BR" sz="2000" dirty="0" smtClean="0"/>
+              <a:t>Consulta na tabela Clientes envolvendo Junção das tabelas </a:t>
+            </a:r>
+            <a:r>
+              <a:rPr lang="pt-BR" sz="2000" dirty="0"/>
+              <a:t>Clientes, </a:t>
+            </a:r>
+            <a:r>
+              <a:rPr lang="pt-BR" sz="2000" dirty="0" smtClean="0"/>
+              <a:t> Pedidos, Itens do pedido </a:t>
+            </a:r>
+            <a:r>
+              <a:rPr lang="pt-BR" sz="2000" dirty="0"/>
+              <a:t>e </a:t>
+            </a:r>
+            <a:r>
+              <a:rPr lang="pt-BR" sz="2000" dirty="0" smtClean="0"/>
+              <a:t>telefones  (MySql Workbench)</a:t>
+            </a:r>
+            <a:endParaRPr lang="pt-BR" sz="2000" dirty="0"/>
+          </a:p>
+        </p:txBody>
+      </p:sp>
+      <p:pic>
+        <p:nvPicPr>
+          <p:cNvPr id="8194" name="Picture 2"/>
+          <p:cNvPicPr>
+            <a:picLocks noChangeAspect="1" noChangeArrowheads="1"/>
+          </p:cNvPicPr>
+          <p:nvPr/>
+        </p:nvPicPr>
+        <p:blipFill>
+          <a:blip r:embed="rId3">
+            <a:extLst>
+              <a:ext uri="{28A0092B-C50C-407E-A947-70E740481C1C}">
+                <a14:useLocalDpi xmlns:a14="http://schemas.microsoft.com/office/drawing/2010/main" val="0"/>
+              </a:ext>
+            </a:extLst>
+          </a:blip>
+          <a:srcRect/>
+          <a:stretch>
+            <a:fillRect/>
+          </a:stretch>
+        </p:blipFill>
+        <p:spPr bwMode="auto">
+          <a:xfrm>
+            <a:off x="192746" y="1059582"/>
+            <a:ext cx="8555718" cy="3933825"/>
+          </a:xfrm>
+          <a:prstGeom prst="rect">
+            <a:avLst/>
+          </a:prstGeom>
+          <a:noFill/>
+          <a:ln>
+            <a:noFill/>
+          </a:ln>
+          <a:effectLst/>
+          <a:extLst>
+            <a:ext uri="{909E8E84-426E-40DD-AFC4-6F175D3DCCD1}">
+              <a14:hiddenFill xmlns:a14="http://schemas.microsoft.com/office/drawing/2010/main">
+                <a:solidFill>
+                  <a:schemeClr val="accent1"/>
+                </a:solidFill>
+              </a14:hiddenFill>
+            </a:ext>
+            <a:ext uri="{91240B29-F687-4F45-9708-019B960494DF}">
+              <a14:hiddenLine xmlns:a14="http://schemas.microsoft.com/office/drawing/2010/main" w="9525">
+                <a:solidFill>
+                  <a:schemeClr val="tx1"/>
+                </a:solidFill>
+                <a:miter lim="800000"/>
+                <a:headEnd/>
+                <a:tailEnd/>
+              </a14:hiddenLine>
+            </a:ext>
+            <a:ext uri="{AF507438-7753-43E0-B8FC-AC1667EBCBE1}">
+              <a14:hiddenEffects xmlns:a14="http://schemas.microsoft.com/office/drawing/2010/main">
+                <a:effectLst>
+                  <a:outerShdw dist="35921" dir="2700000" algn="ctr" rotWithShape="0">
+                    <a:schemeClr val="bg2"/>
+                  </a:outerShdw>
+                </a:effectLst>
+              </a14:hiddenEffects>
+            </a:ext>
+          </a:extLst>
+        </p:spPr>
+      </p:pic>
+    </p:spTree>
+    <p:extLst>
+      <p:ext uri="{BB962C8B-B14F-4D97-AF65-F5344CB8AC3E}">
+        <p14:creationId xmlns:p14="http://schemas.microsoft.com/office/powerpoint/2010/main" val="3911961522"/>
+      </p:ext>
+    </p:extLst>
+  </p:cSld>
+  <p:clrMapOvr>
+    <a:masterClrMapping/>
+  </p:clrMapOvr>
+  <p:timing>
+    <p:tnLst>
+      <p:par>
+        <p:cTn id="1" dur="indefinite" restart="never" nodeType="tmRoot"/>
+      </p:par>
+    </p:tnLst>
+  </p:timing>
+</p:sld>
+</file>
+
+<file path=ppt/slides/slide22.xml><?xml version="1.0" encoding="utf-8"?>
+<p:sld xmlns:a="http://schemas.openxmlformats.org/drawingml/2006/main" xmlns:r="http://schemas.openxmlformats.org/officeDocument/2006/relationships" xmlns:p="http://schemas.openxmlformats.org/presentationml/2006/main">
+  <p:cSld>
+    <p:bg>
+      <p:bgPr>
+        <a:gradFill>
+          <a:gsLst>
+            <a:gs pos="100000">
+              <a:schemeClr val="bg1">
+                <a:lumMod val="95000"/>
+              </a:schemeClr>
+            </a:gs>
+            <a:gs pos="95000">
+              <a:schemeClr val="tx2">
+                <a:lumMod val="20000"/>
+                <a:lumOff val="80000"/>
+              </a:schemeClr>
+            </a:gs>
+          </a:gsLst>
+          <a:lin ang="5400000" scaled="0"/>
+        </a:gradFill>
+        <a:effectLst/>
+      </p:bgPr>
+    </p:bg>
+    <p:spTree>
+      <p:nvGrpSpPr>
+        <p:cNvPr id="1" name="Shape 1144"/>
+        <p:cNvGrpSpPr/>
+        <p:nvPr/>
+      </p:nvGrpSpPr>
+      <p:grpSpPr>
+        <a:xfrm>
+          <a:off x="0" y="0"/>
+          <a:ext cx="0" cy="0"/>
+          <a:chOff x="0" y="0"/>
+          <a:chExt cx="0" cy="0"/>
+        </a:xfrm>
+      </p:grpSpPr>
+      <p:sp>
+        <p:nvSpPr>
+          <p:cNvPr id="11" name="Google Shape;1146;p53"/>
+          <p:cNvSpPr txBox="1">
+            <a:spLocks/>
+          </p:cNvSpPr>
+          <p:nvPr/>
+        </p:nvSpPr>
+        <p:spPr>
+          <a:xfrm>
             <a:off x="179512" y="51470"/>
             <a:ext cx="8712968" cy="1080120"/>
           </a:xfrm>
@@ -28550,7 +30020,7 @@
 </p:sld>
 </file>
 
-<file path=ppt/slides/slide21.xml><?xml version="1.0" encoding="utf-8"?>
+<file path=ppt/slides/slide23.xml><?xml version="1.0" encoding="utf-8"?>
 <p:sld xmlns:a="http://schemas.openxmlformats.org/drawingml/2006/main" xmlns:r="http://schemas.openxmlformats.org/officeDocument/2006/relationships" xmlns:p="http://schemas.openxmlformats.org/presentationml/2006/main">
   <p:cSld>
     <p:spTree>
@@ -29031,7 +30501,7 @@
 </p:sld>
 </file>
 
-<file path=ppt/slides/slide22.xml><?xml version="1.0" encoding="utf-8"?>
+<file path=ppt/slides/slide24.xml><?xml version="1.0" encoding="utf-8"?>
 <p:sld xmlns:a="http://schemas.openxmlformats.org/drawingml/2006/main" xmlns:r="http://schemas.openxmlformats.org/officeDocument/2006/relationships" xmlns:p="http://schemas.openxmlformats.org/presentationml/2006/main">
   <p:cSld>
     <p:spTree>
@@ -40741,6 +42211,520 @@
       <p:bgPr>
         <a:gradFill>
           <a:gsLst>
+            <a:gs pos="0">
+              <a:schemeClr val="accent1">
+                <a:tint val="66000"/>
+                <a:satMod val="160000"/>
+              </a:schemeClr>
+            </a:gs>
+            <a:gs pos="50000">
+              <a:schemeClr val="accent1">
+                <a:tint val="44500"/>
+                <a:satMod val="160000"/>
+              </a:schemeClr>
+            </a:gs>
+            <a:gs pos="100000">
+              <a:schemeClr val="accent1">
+                <a:tint val="23500"/>
+                <a:satMod val="160000"/>
+              </a:schemeClr>
+            </a:gs>
+          </a:gsLst>
+          <a:lin ang="5400000" scaled="0"/>
+        </a:gradFill>
+        <a:effectLst/>
+      </p:bgPr>
+    </p:bg>
+    <p:spTree>
+      <p:nvGrpSpPr>
+        <p:cNvPr id="1" name="Shape 532"/>
+        <p:cNvGrpSpPr/>
+        <p:nvPr/>
+      </p:nvGrpSpPr>
+      <p:grpSpPr>
+        <a:xfrm>
+          <a:off x="0" y="0"/>
+          <a:ext cx="0" cy="0"/>
+          <a:chOff x="0" y="0"/>
+          <a:chExt cx="0" cy="0"/>
+        </a:xfrm>
+      </p:grpSpPr>
+      <p:sp>
+        <p:nvSpPr>
+          <p:cNvPr id="535" name="Google Shape;535;p45"/>
+          <p:cNvSpPr txBox="1">
+            <a:spLocks noGrp="1"/>
+          </p:cNvSpPr>
+          <p:nvPr>
+            <p:ph type="subTitle" idx="3"/>
+          </p:nvPr>
+        </p:nvSpPr>
+        <p:spPr>
+          <a:xfrm>
+            <a:off x="2032000" y="1327391"/>
+            <a:ext cx="6641506" cy="1736732"/>
+          </a:xfrm>
+          <a:prstGeom prst="rect">
+            <a:avLst/>
+          </a:prstGeom>
+        </p:spPr>
+        <p:txBody>
+          <a:bodyPr spcFirstLastPara="1" wrap="square" lIns="91425" tIns="91425" rIns="91425" bIns="91425" anchor="t" anchorCtr="0">
+            <a:noAutofit/>
+          </a:bodyPr>
+          <a:lstStyle/>
+          <a:p>
+            <a:pPr marL="0" lvl="0" indent="0">
+              <a:lnSpc>
+                <a:spcPct val="100000"/>
+              </a:lnSpc>
+            </a:pPr>
+            <a:r>
+              <a:rPr lang="pt-BR" dirty="0"/>
+              <a:t>Os usuários devem ser incentivados a criar senhas fortes e únicas, e a plataforma deve ter medidas de autenticação forte para garantir que apenas usuários autorizados tenham acesso às suas contas. Finalmente, a plataforma deve ser atualizada regularmente, com novos recursos e melhorias que melhorem a experiência do usuário e mantenham a segurança do sistema.</a:t>
+            </a:r>
+            <a:endParaRPr b="1" i="1" dirty="0">
+              <a:solidFill>
+                <a:schemeClr val="bg1"/>
+              </a:solidFill>
+            </a:endParaRPr>
+          </a:p>
+        </p:txBody>
+      </p:sp>
+      <p:sp>
+        <p:nvSpPr>
+          <p:cNvPr id="537" name="Google Shape;537;p45"/>
+          <p:cNvSpPr txBox="1">
+            <a:spLocks noGrp="1"/>
+          </p:cNvSpPr>
+          <p:nvPr>
+            <p:ph type="title"/>
+          </p:nvPr>
+        </p:nvSpPr>
+        <p:spPr>
+          <a:xfrm>
+            <a:off x="4932040" y="166610"/>
+            <a:ext cx="4032447" cy="647700"/>
+          </a:xfrm>
+          <a:prstGeom prst="rect">
+            <a:avLst/>
+          </a:prstGeom>
+        </p:spPr>
+        <p:txBody>
+          <a:bodyPr spcFirstLastPara="1" wrap="square" lIns="91425" tIns="91425" rIns="91425" bIns="91425" anchor="ctr" anchorCtr="0">
+            <a:noAutofit/>
+          </a:bodyPr>
+          <a:lstStyle/>
+          <a:p>
+            <a:pPr marL="0" lvl="0" indent="0" algn="ctr" rtl="0">
+              <a:spcBef>
+                <a:spcPts val="0"/>
+              </a:spcBef>
+              <a:spcAft>
+                <a:spcPts val="0"/>
+              </a:spcAft>
+              <a:buNone/>
+            </a:pPr>
+            <a:r>
+              <a:rPr lang="pt-BR" dirty="0" smtClean="0"/>
+              <a:t>Entidade Usuários</a:t>
+            </a:r>
+            <a:endParaRPr dirty="0">
+              <a:solidFill>
+                <a:schemeClr val="dk2"/>
+              </a:solidFill>
+            </a:endParaRPr>
+          </a:p>
+        </p:txBody>
+      </p:sp>
+      <p:sp>
+        <p:nvSpPr>
+          <p:cNvPr id="540" name="Google Shape;540;p45"/>
+          <p:cNvSpPr txBox="1">
+            <a:spLocks noGrp="1"/>
+          </p:cNvSpPr>
+          <p:nvPr>
+            <p:ph type="subTitle" idx="7"/>
+          </p:nvPr>
+        </p:nvSpPr>
+        <p:spPr>
+          <a:xfrm>
+            <a:off x="489441" y="3147814"/>
+            <a:ext cx="1453200" cy="572700"/>
+          </a:xfrm>
+          <a:prstGeom prst="rect">
+            <a:avLst/>
+          </a:prstGeom>
+        </p:spPr>
+        <p:txBody>
+          <a:bodyPr spcFirstLastPara="1" wrap="square" lIns="91425" tIns="91425" rIns="91425" bIns="91425" anchor="t" anchorCtr="0">
+            <a:noAutofit/>
+          </a:bodyPr>
+          <a:lstStyle/>
+          <a:p>
+            <a:pPr marL="0" lvl="0" indent="0"/>
+            <a:r>
+              <a:rPr lang="pt-BR" dirty="0" smtClean="0">
+                <a:solidFill>
+                  <a:schemeClr val="bg2"/>
+                </a:solidFill>
+              </a:rPr>
+              <a:t>Usuários</a:t>
+            </a:r>
+          </a:p>
+          <a:p>
+            <a:pPr marL="0" lvl="0" indent="0"/>
+            <a:endParaRPr dirty="0">
+              <a:solidFill>
+                <a:schemeClr val="bg2"/>
+              </a:solidFill>
+            </a:endParaRPr>
+          </a:p>
+        </p:txBody>
+      </p:sp>
+      <p:grpSp>
+        <p:nvGrpSpPr>
+          <p:cNvPr id="542" name="Google Shape;542;p45"/>
+          <p:cNvGrpSpPr/>
+          <p:nvPr/>
+        </p:nvGrpSpPr>
+        <p:grpSpPr>
+          <a:xfrm>
+            <a:off x="627229" y="1347614"/>
+            <a:ext cx="1179900" cy="1747986"/>
+            <a:chOff x="1367125" y="1476625"/>
+            <a:chExt cx="1179900" cy="1800200"/>
+          </a:xfrm>
+        </p:grpSpPr>
+        <p:sp>
+          <p:nvSpPr>
+            <p:cNvPr id="543" name="Google Shape;543;p45"/>
+            <p:cNvSpPr/>
+            <p:nvPr/>
+          </p:nvSpPr>
+          <p:spPr>
+            <a:xfrm>
+              <a:off x="1367125" y="1476625"/>
+              <a:ext cx="1179900" cy="1179900"/>
+            </a:xfrm>
+            <a:prstGeom prst="ellipse">
+              <a:avLst/>
+            </a:prstGeom>
+            <a:noFill/>
+            <a:ln w="38100" cap="flat" cmpd="sng">
+              <a:solidFill>
+                <a:schemeClr val="lt1"/>
+              </a:solidFill>
+              <a:prstDash val="solid"/>
+              <a:round/>
+              <a:headEnd type="none" w="sm" len="sm"/>
+              <a:tailEnd type="none" w="sm" len="sm"/>
+            </a:ln>
+          </p:spPr>
+          <p:txBody>
+            <a:bodyPr spcFirstLastPara="1" wrap="square" lIns="91425" tIns="91425" rIns="91425" bIns="91425" anchor="ctr" anchorCtr="0">
+              <a:noAutofit/>
+            </a:bodyPr>
+            <a:lstStyle/>
+            <a:p>
+              <a:pPr marL="0" lvl="0" indent="0" algn="l" rtl="0">
+                <a:spcBef>
+                  <a:spcPts val="0"/>
+                </a:spcBef>
+                <a:spcAft>
+                  <a:spcPts val="0"/>
+                </a:spcAft>
+                <a:buNone/>
+              </a:pPr>
+              <a:endParaRPr>
+                <a:solidFill>
+                  <a:schemeClr val="bg2"/>
+                </a:solidFill>
+              </a:endParaRPr>
+            </a:p>
+          </p:txBody>
+        </p:sp>
+        <p:cxnSp>
+          <p:nvCxnSpPr>
+            <p:cNvPr id="544" name="Google Shape;544;p45"/>
+            <p:cNvCxnSpPr>
+              <a:stCxn id="543" idx="4"/>
+              <a:endCxn id="540" idx="0"/>
+            </p:cNvCxnSpPr>
+            <p:nvPr/>
+          </p:nvCxnSpPr>
+          <p:spPr>
+            <a:xfrm flipH="1">
+              <a:off x="1955937" y="2656525"/>
+              <a:ext cx="1138" cy="620300"/>
+            </a:xfrm>
+            <a:prstGeom prst="straightConnector1">
+              <a:avLst/>
+            </a:prstGeom>
+            <a:noFill/>
+            <a:ln w="38100" cap="flat" cmpd="sng">
+              <a:solidFill>
+                <a:schemeClr val="lt1"/>
+              </a:solidFill>
+              <a:prstDash val="solid"/>
+              <a:round/>
+              <a:headEnd type="none" w="med" len="med"/>
+              <a:tailEnd type="none" w="med" len="med"/>
+            </a:ln>
+          </p:spPr>
+        </p:cxnSp>
+      </p:grpSp>
+      <p:pic>
+        <p:nvPicPr>
+          <p:cNvPr id="38" name="Picture 6"/>
+          <p:cNvPicPr>
+            <a:picLocks noChangeAspect="1" noChangeArrowheads="1"/>
+          </p:cNvPicPr>
+          <p:nvPr/>
+        </p:nvPicPr>
+        <p:blipFill>
+          <a:blip r:embed="rId3">
+            <a:extLst>
+              <a:ext uri="{28A0092B-C50C-407E-A947-70E740481C1C}">
+                <a14:useLocalDpi xmlns:a14="http://schemas.microsoft.com/office/drawing/2010/main" val="0"/>
+              </a:ext>
+            </a:extLst>
+          </a:blip>
+          <a:srcRect/>
+          <a:stretch>
+            <a:fillRect/>
+          </a:stretch>
+        </p:blipFill>
+        <p:spPr bwMode="auto">
+          <a:xfrm>
+            <a:off x="-316152" y="490460"/>
+            <a:ext cx="2123281" cy="803430"/>
+          </a:xfrm>
+          <a:prstGeom prst="rect">
+            <a:avLst/>
+          </a:prstGeom>
+          <a:noFill/>
+          <a:ln>
+            <a:noFill/>
+          </a:ln>
+          <a:effectLst/>
+          <a:extLst>
+            <a:ext uri="{909E8E84-426E-40DD-AFC4-6F175D3DCCD1}">
+              <a14:hiddenFill xmlns:a14="http://schemas.microsoft.com/office/drawing/2010/main">
+                <a:solidFill>
+                  <a:schemeClr val="accent1"/>
+                </a:solidFill>
+              </a14:hiddenFill>
+            </a:ext>
+            <a:ext uri="{91240B29-F687-4F45-9708-019B960494DF}">
+              <a14:hiddenLine xmlns:a14="http://schemas.microsoft.com/office/drawing/2010/main" w="9525">
+                <a:solidFill>
+                  <a:schemeClr val="tx1"/>
+                </a:solidFill>
+                <a:miter lim="800000"/>
+                <a:headEnd/>
+                <a:tailEnd/>
+              </a14:hiddenLine>
+            </a:ext>
+            <a:ext uri="{AF507438-7753-43E0-B8FC-AC1667EBCBE1}">
+              <a14:hiddenEffects xmlns:a14="http://schemas.microsoft.com/office/drawing/2010/main">
+                <a:effectLst>
+                  <a:outerShdw dist="35921" dir="2700000" algn="ctr" rotWithShape="0">
+                    <a:schemeClr val="bg2"/>
+                  </a:outerShdw>
+                </a:effectLst>
+              </a14:hiddenEffects>
+            </a:ext>
+          </a:extLst>
+        </p:spPr>
+      </p:pic>
+      <p:sp>
+        <p:nvSpPr>
+          <p:cNvPr id="2" name="AutoShape 2" descr="Estilo, cesta, ícone, alimento, esboço. Icon., isolado, teia, cesta,  vetorial, ícone, alimento, esboço, fundo, branca, | CanStock"/>
+          <p:cNvSpPr>
+            <a:spLocks noChangeAspect="1" noChangeArrowheads="1"/>
+          </p:cNvSpPr>
+          <p:nvPr/>
+        </p:nvSpPr>
+        <p:spPr bwMode="auto">
+          <a:xfrm>
+            <a:off x="155575" y="-822325"/>
+            <a:ext cx="1876425" cy="1714500"/>
+          </a:xfrm>
+          <a:prstGeom prst="rect">
+            <a:avLst/>
+          </a:prstGeom>
+          <a:noFill/>
+          <a:extLst>
+            <a:ext uri="{909E8E84-426E-40DD-AFC4-6F175D3DCCD1}">
+              <a14:hiddenFill xmlns:a14="http://schemas.microsoft.com/office/drawing/2010/main">
+                <a:solidFill>
+                  <a:srgbClr val="FFFFFF"/>
+                </a:solidFill>
+              </a14:hiddenFill>
+            </a:ext>
+          </a:extLst>
+        </p:spPr>
+        <p:txBody>
+          <a:bodyPr vert="horz" wrap="square" lIns="91440" tIns="45720" rIns="91440" bIns="45720" numCol="1" anchor="t" anchorCtr="0" compatLnSpc="1">
+            <a:prstTxWarp prst="textNoShape">
+              <a:avLst/>
+            </a:prstTxWarp>
+          </a:bodyPr>
+          <a:lstStyle/>
+          <a:p>
+            <a:endParaRPr lang="pt-BR"/>
+          </a:p>
+        </p:txBody>
+      </p:sp>
+      <p:pic>
+        <p:nvPicPr>
+          <p:cNvPr id="3076" name="Picture 4"/>
+          <p:cNvPicPr>
+            <a:picLocks noChangeAspect="1" noChangeArrowheads="1"/>
+          </p:cNvPicPr>
+          <p:nvPr/>
+        </p:nvPicPr>
+        <p:blipFill>
+          <a:blip r:embed="rId4">
+            <a:extLst>
+              <a:ext uri="{28A0092B-C50C-407E-A947-70E740481C1C}">
+                <a14:useLocalDpi xmlns:a14="http://schemas.microsoft.com/office/drawing/2010/main" val="0"/>
+              </a:ext>
+            </a:extLst>
+          </a:blip>
+          <a:srcRect/>
+          <a:stretch>
+            <a:fillRect/>
+          </a:stretch>
+        </p:blipFill>
+        <p:spPr bwMode="auto">
+          <a:xfrm>
+            <a:off x="748236" y="1451375"/>
+            <a:ext cx="962869" cy="962869"/>
+          </a:xfrm>
+          <a:prstGeom prst="rect">
+            <a:avLst/>
+          </a:prstGeom>
+          <a:noFill/>
+          <a:ln>
+            <a:noFill/>
+          </a:ln>
+          <a:effectLst/>
+          <a:extLst>
+            <a:ext uri="{909E8E84-426E-40DD-AFC4-6F175D3DCCD1}">
+              <a14:hiddenFill xmlns:a14="http://schemas.microsoft.com/office/drawing/2010/main">
+                <a:solidFill>
+                  <a:schemeClr val="accent1"/>
+                </a:solidFill>
+              </a14:hiddenFill>
+            </a:ext>
+            <a:ext uri="{91240B29-F687-4F45-9708-019B960494DF}">
+              <a14:hiddenLine xmlns:a14="http://schemas.microsoft.com/office/drawing/2010/main" w="9525">
+                <a:solidFill>
+                  <a:schemeClr val="tx1"/>
+                </a:solidFill>
+                <a:miter lim="800000"/>
+                <a:headEnd/>
+                <a:tailEnd/>
+              </a14:hiddenLine>
+            </a:ext>
+            <a:ext uri="{AF507438-7753-43E0-B8FC-AC1667EBCBE1}">
+              <a14:hiddenEffects xmlns:a14="http://schemas.microsoft.com/office/drawing/2010/main">
+                <a:effectLst>
+                  <a:outerShdw dist="35921" dir="2700000" algn="ctr" rotWithShape="0">
+                    <a:schemeClr val="bg2"/>
+                  </a:outerShdw>
+                </a:effectLst>
+              </a14:hiddenEffects>
+            </a:ext>
+          </a:extLst>
+        </p:spPr>
+      </p:pic>
+      <p:sp>
+        <p:nvSpPr>
+          <p:cNvPr id="20" name="Google Shape;535;p45"/>
+          <p:cNvSpPr txBox="1">
+            <a:spLocks noGrp="1"/>
+          </p:cNvSpPr>
+          <p:nvPr>
+            <p:ph type="subTitle" idx="3"/>
+          </p:nvPr>
+        </p:nvSpPr>
+        <p:spPr>
+          <a:xfrm>
+            <a:off x="1907704" y="2643758"/>
+            <a:ext cx="6480720" cy="2283796"/>
+          </a:xfrm>
+          <a:prstGeom prst="rect">
+            <a:avLst/>
+          </a:prstGeom>
+        </p:spPr>
+        <p:txBody>
+          <a:bodyPr spcFirstLastPara="1" wrap="square" lIns="91425" tIns="91425" rIns="91425" bIns="91425" anchor="t" anchorCtr="0">
+            <a:noAutofit/>
+          </a:bodyPr>
+          <a:lstStyle/>
+          <a:p>
+            <a:r>
+              <a:rPr lang="pt-BR" dirty="0">
+                <a:solidFill>
+                  <a:schemeClr val="bg2"/>
+                </a:solidFill>
+              </a:rPr>
+              <a:t>O uso de criptografia de senha é uma das medidas mais importantes para garantir a segurança dos dados do usuário, e o padrão AES 256 é considerado um dos mais seguros e amplamente utilizados na indústria de segurança da informação. </a:t>
+            </a:r>
+            <a:r>
+              <a:rPr lang="pt-BR" dirty="0" smtClean="0">
+                <a:solidFill>
+                  <a:schemeClr val="bg2"/>
+                </a:solidFill>
+              </a:rPr>
+              <a:t>É  importante </a:t>
+            </a:r>
+            <a:r>
+              <a:rPr lang="pt-BR" dirty="0">
+                <a:solidFill>
+                  <a:schemeClr val="bg2"/>
+                </a:solidFill>
+              </a:rPr>
+              <a:t>definir regras claras para as senhas dos usuários, como requisitos mínimos de comprimento, uso de caracteres especiais, letras maiúsculas e minúsculas, para garantir que as senhas sejam fortes o suficiente para resistir a ataques de hackers.</a:t>
+            </a:r>
+            <a:endParaRPr lang="pt-BR" dirty="0">
+              <a:solidFill>
+                <a:schemeClr val="bg2"/>
+              </a:solidFill>
+            </a:endParaRPr>
+          </a:p>
+        </p:txBody>
+      </p:sp>
+    </p:spTree>
+    <p:extLst>
+      <p:ext uri="{BB962C8B-B14F-4D97-AF65-F5344CB8AC3E}">
+        <p14:creationId xmlns:p14="http://schemas.microsoft.com/office/powerpoint/2010/main" val="1479368981"/>
+      </p:ext>
+    </p:extLst>
+  </p:cSld>
+  <p:clrMapOvr>
+    <a:masterClrMapping/>
+  </p:clrMapOvr>
+  <p:timing>
+    <p:tnLst>
+      <p:par>
+        <p:cTn id="1" dur="indefinite" restart="never" nodeType="tmRoot"/>
+      </p:par>
+    </p:tnLst>
+  </p:timing>
+</p:sld>
+</file>
+
+<file path=ppt/slides/slide9.xml><?xml version="1.0" encoding="utf-8"?>
+<p:sld xmlns:a="http://schemas.openxmlformats.org/drawingml/2006/main" xmlns:r="http://schemas.openxmlformats.org/officeDocument/2006/relationships" xmlns:p="http://schemas.openxmlformats.org/presentationml/2006/main">
+  <p:cSld>
+    <p:bg>
+      <p:bgPr>
+        <a:gradFill>
+          <a:gsLst>
             <a:gs pos="100000">
               <a:schemeClr val="bg1"/>
             </a:gs>
@@ -41796,530 +43780,6 @@
         </p:spPr>
       </p:pic>
     </p:spTree>
-  </p:cSld>
-  <p:clrMapOvr>
-    <a:masterClrMapping/>
-  </p:clrMapOvr>
-  <p:timing>
-    <p:tnLst>
-      <p:par>
-        <p:cTn id="1" dur="indefinite" restart="never" nodeType="tmRoot"/>
-      </p:par>
-    </p:tnLst>
-  </p:timing>
-</p:sld>
-</file>
-
-<file path=ppt/slides/slide9.xml><?xml version="1.0" encoding="utf-8"?>
-<p:sld xmlns:a="http://schemas.openxmlformats.org/drawingml/2006/main" xmlns:r="http://schemas.openxmlformats.org/officeDocument/2006/relationships" xmlns:p="http://schemas.openxmlformats.org/presentationml/2006/main">
-  <p:cSld>
-    <p:bg>
-      <p:bgPr>
-        <a:gradFill>
-          <a:gsLst>
-            <a:gs pos="100000">
-              <a:schemeClr val="bg1"/>
-            </a:gs>
-            <a:gs pos="3000">
-              <a:schemeClr val="bg2"/>
-            </a:gs>
-            <a:gs pos="70000">
-              <a:schemeClr val="accent1">
-                <a:tint val="23500"/>
-                <a:satMod val="160000"/>
-              </a:schemeClr>
-            </a:gs>
-          </a:gsLst>
-          <a:lin ang="5400000" scaled="0"/>
-        </a:gradFill>
-        <a:effectLst/>
-      </p:bgPr>
-    </p:bg>
-    <p:spTree>
-      <p:nvGrpSpPr>
-        <p:cNvPr id="1" name="Shape 532"/>
-        <p:cNvGrpSpPr/>
-        <p:nvPr/>
-      </p:nvGrpSpPr>
-      <p:grpSpPr>
-        <a:xfrm>
-          <a:off x="0" y="0"/>
-          <a:ext cx="0" cy="0"/>
-          <a:chOff x="0" y="0"/>
-          <a:chExt cx="0" cy="0"/>
-        </a:xfrm>
-      </p:grpSpPr>
-      <p:sp>
-        <p:nvSpPr>
-          <p:cNvPr id="535" name="Google Shape;535;p45"/>
-          <p:cNvSpPr txBox="1">
-            <a:spLocks noGrp="1"/>
-          </p:cNvSpPr>
-          <p:nvPr>
-            <p:ph type="subTitle" idx="3"/>
-          </p:nvPr>
-        </p:nvSpPr>
-        <p:spPr>
-          <a:xfrm>
-            <a:off x="2123728" y="1483090"/>
-            <a:ext cx="4392488" cy="1010202"/>
-          </a:xfrm>
-          <a:prstGeom prst="rect">
-            <a:avLst/>
-          </a:prstGeom>
-        </p:spPr>
-        <p:txBody>
-          <a:bodyPr spcFirstLastPara="1" wrap="square" lIns="91425" tIns="91425" rIns="91425" bIns="91425" anchor="t" anchorCtr="0">
-            <a:noAutofit/>
-          </a:bodyPr>
-          <a:lstStyle/>
-          <a:p>
-            <a:pPr marL="0" lvl="0" indent="0">
-              <a:lnSpc>
-                <a:spcPct val="100000"/>
-              </a:lnSpc>
-            </a:pPr>
-            <a:r>
-              <a:rPr lang="pt-BR" b="1" i="1" dirty="0">
-                <a:solidFill>
-                  <a:schemeClr val="bg1"/>
-                </a:solidFill>
-              </a:rPr>
-              <a:t>Armazenamento dos números de telefone dos clientes: É importante armazenar os números de telefone dos clientes para que possam ser utilizados para fins de contato.</a:t>
-            </a:r>
-            <a:endParaRPr b="1" i="1" dirty="0">
-              <a:solidFill>
-                <a:schemeClr val="bg1"/>
-              </a:solidFill>
-            </a:endParaRPr>
-          </a:p>
-        </p:txBody>
-      </p:sp>
-      <p:sp>
-        <p:nvSpPr>
-          <p:cNvPr id="537" name="Google Shape;537;p45"/>
-          <p:cNvSpPr txBox="1">
-            <a:spLocks noGrp="1"/>
-          </p:cNvSpPr>
-          <p:nvPr>
-            <p:ph type="title"/>
-          </p:nvPr>
-        </p:nvSpPr>
-        <p:spPr>
-          <a:xfrm>
-            <a:off x="2339752" y="123478"/>
-            <a:ext cx="6624735" cy="647700"/>
-          </a:xfrm>
-          <a:prstGeom prst="rect">
-            <a:avLst/>
-          </a:prstGeom>
-        </p:spPr>
-        <p:txBody>
-          <a:bodyPr spcFirstLastPara="1" wrap="square" lIns="91425" tIns="91425" rIns="91425" bIns="91425" anchor="ctr" anchorCtr="0">
-            <a:noAutofit/>
-          </a:bodyPr>
-          <a:lstStyle/>
-          <a:p>
-            <a:pPr marL="0" lvl="0" indent="0" algn="r" rtl="0">
-              <a:spcBef>
-                <a:spcPts val="0"/>
-              </a:spcBef>
-              <a:spcAft>
-                <a:spcPts val="0"/>
-              </a:spcAft>
-              <a:buNone/>
-            </a:pPr>
-            <a:r>
-              <a:rPr lang="pt-BR" dirty="0" smtClean="0"/>
-              <a:t>Normalização da</a:t>
-            </a:r>
-            <a:r>
-              <a:rPr lang="pt-BR" dirty="0" smtClean="0">
-                <a:solidFill>
-                  <a:schemeClr val="dk2"/>
-                </a:solidFill>
-              </a:rPr>
-              <a:t> Entidade Telefone</a:t>
-            </a:r>
-            <a:endParaRPr dirty="0">
-              <a:solidFill>
-                <a:schemeClr val="dk2"/>
-              </a:solidFill>
-            </a:endParaRPr>
-          </a:p>
-        </p:txBody>
-      </p:sp>
-      <p:sp>
-        <p:nvSpPr>
-          <p:cNvPr id="540" name="Google Shape;540;p45"/>
-          <p:cNvSpPr txBox="1">
-            <a:spLocks noGrp="1"/>
-          </p:cNvSpPr>
-          <p:nvPr>
-            <p:ph type="subTitle" idx="7"/>
-          </p:nvPr>
-        </p:nvSpPr>
-        <p:spPr>
-          <a:xfrm>
-            <a:off x="489441" y="3147814"/>
-            <a:ext cx="1453200" cy="572700"/>
-          </a:xfrm>
-          <a:prstGeom prst="rect">
-            <a:avLst/>
-          </a:prstGeom>
-        </p:spPr>
-        <p:txBody>
-          <a:bodyPr spcFirstLastPara="1" wrap="square" lIns="91425" tIns="91425" rIns="91425" bIns="91425" anchor="t" anchorCtr="0">
-            <a:noAutofit/>
-          </a:bodyPr>
-          <a:lstStyle/>
-          <a:p>
-            <a:pPr marL="0" lvl="0" indent="0"/>
-            <a:r>
-              <a:rPr lang="pt-BR" dirty="0" smtClean="0">
-                <a:solidFill>
-                  <a:schemeClr val="bg2"/>
-                </a:solidFill>
-              </a:rPr>
-              <a:t>Telefones</a:t>
-            </a:r>
-            <a:endParaRPr dirty="0">
-              <a:solidFill>
-                <a:schemeClr val="bg2"/>
-              </a:solidFill>
-            </a:endParaRPr>
-          </a:p>
-        </p:txBody>
-      </p:sp>
-      <p:grpSp>
-        <p:nvGrpSpPr>
-          <p:cNvPr id="542" name="Google Shape;542;p45"/>
-          <p:cNvGrpSpPr/>
-          <p:nvPr/>
-        </p:nvGrpSpPr>
-        <p:grpSpPr>
-          <a:xfrm>
-            <a:off x="627229" y="1347614"/>
-            <a:ext cx="1179900" cy="1747986"/>
-            <a:chOff x="1367125" y="1476625"/>
-            <a:chExt cx="1179900" cy="1800200"/>
-          </a:xfrm>
-        </p:grpSpPr>
-        <p:sp>
-          <p:nvSpPr>
-            <p:cNvPr id="543" name="Google Shape;543;p45"/>
-            <p:cNvSpPr/>
-            <p:nvPr/>
-          </p:nvSpPr>
-          <p:spPr>
-            <a:xfrm>
-              <a:off x="1367125" y="1476625"/>
-              <a:ext cx="1179900" cy="1179900"/>
-            </a:xfrm>
-            <a:prstGeom prst="ellipse">
-              <a:avLst/>
-            </a:prstGeom>
-            <a:noFill/>
-            <a:ln w="38100" cap="flat" cmpd="sng">
-              <a:solidFill>
-                <a:schemeClr val="lt1"/>
-              </a:solidFill>
-              <a:prstDash val="solid"/>
-              <a:round/>
-              <a:headEnd type="none" w="sm" len="sm"/>
-              <a:tailEnd type="none" w="sm" len="sm"/>
-            </a:ln>
-          </p:spPr>
-          <p:txBody>
-            <a:bodyPr spcFirstLastPara="1" wrap="square" lIns="91425" tIns="91425" rIns="91425" bIns="91425" anchor="ctr" anchorCtr="0">
-              <a:noAutofit/>
-            </a:bodyPr>
-            <a:lstStyle/>
-            <a:p>
-              <a:pPr marL="0" lvl="0" indent="0" algn="l" rtl="0">
-                <a:spcBef>
-                  <a:spcPts val="0"/>
-                </a:spcBef>
-                <a:spcAft>
-                  <a:spcPts val="0"/>
-                </a:spcAft>
-                <a:buNone/>
-              </a:pPr>
-              <a:endParaRPr>
-                <a:solidFill>
-                  <a:schemeClr val="bg2"/>
-                </a:solidFill>
-              </a:endParaRPr>
-            </a:p>
-          </p:txBody>
-        </p:sp>
-        <p:cxnSp>
-          <p:nvCxnSpPr>
-            <p:cNvPr id="544" name="Google Shape;544;p45"/>
-            <p:cNvCxnSpPr>
-              <a:stCxn id="543" idx="4"/>
-              <a:endCxn id="540" idx="0"/>
-            </p:cNvCxnSpPr>
-            <p:nvPr/>
-          </p:nvCxnSpPr>
-          <p:spPr>
-            <a:xfrm flipH="1">
-              <a:off x="1955937" y="2656525"/>
-              <a:ext cx="1138" cy="620300"/>
-            </a:xfrm>
-            <a:prstGeom prst="straightConnector1">
-              <a:avLst/>
-            </a:prstGeom>
-            <a:noFill/>
-            <a:ln w="38100" cap="flat" cmpd="sng">
-              <a:solidFill>
-                <a:schemeClr val="lt1"/>
-              </a:solidFill>
-              <a:prstDash val="solid"/>
-              <a:round/>
-              <a:headEnd type="none" w="med" len="med"/>
-              <a:tailEnd type="none" w="med" len="med"/>
-            </a:ln>
-          </p:spPr>
-        </p:cxnSp>
-      </p:grpSp>
-      <p:pic>
-        <p:nvPicPr>
-          <p:cNvPr id="38" name="Picture 6"/>
-          <p:cNvPicPr>
-            <a:picLocks noChangeAspect="1" noChangeArrowheads="1"/>
-          </p:cNvPicPr>
-          <p:nvPr/>
-        </p:nvPicPr>
-        <p:blipFill>
-          <a:blip r:embed="rId3">
-            <a:extLst>
-              <a:ext uri="{28A0092B-C50C-407E-A947-70E740481C1C}">
-                <a14:useLocalDpi xmlns:a14="http://schemas.microsoft.com/office/drawing/2010/main" val="0"/>
-              </a:ext>
-            </a:extLst>
-          </a:blip>
-          <a:srcRect/>
-          <a:stretch>
-            <a:fillRect/>
-          </a:stretch>
-        </p:blipFill>
-        <p:spPr bwMode="auto">
-          <a:xfrm>
-            <a:off x="-316152" y="490460"/>
-            <a:ext cx="2123281" cy="803430"/>
-          </a:xfrm>
-          <a:prstGeom prst="rect">
-            <a:avLst/>
-          </a:prstGeom>
-          <a:noFill/>
-          <a:ln>
-            <a:noFill/>
-          </a:ln>
-          <a:effectLst/>
-          <a:extLst>
-            <a:ext uri="{909E8E84-426E-40DD-AFC4-6F175D3DCCD1}">
-              <a14:hiddenFill xmlns:a14="http://schemas.microsoft.com/office/drawing/2010/main">
-                <a:solidFill>
-                  <a:schemeClr val="accent1"/>
-                </a:solidFill>
-              </a14:hiddenFill>
-            </a:ext>
-            <a:ext uri="{91240B29-F687-4F45-9708-019B960494DF}">
-              <a14:hiddenLine xmlns:a14="http://schemas.microsoft.com/office/drawing/2010/main" w="9525">
-                <a:solidFill>
-                  <a:schemeClr val="tx1"/>
-                </a:solidFill>
-                <a:miter lim="800000"/>
-                <a:headEnd/>
-                <a:tailEnd/>
-              </a14:hiddenLine>
-            </a:ext>
-            <a:ext uri="{AF507438-7753-43E0-B8FC-AC1667EBCBE1}">
-              <a14:hiddenEffects xmlns:a14="http://schemas.microsoft.com/office/drawing/2010/main">
-                <a:effectLst>
-                  <a:outerShdw dist="35921" dir="2700000" algn="ctr" rotWithShape="0">
-                    <a:schemeClr val="bg2"/>
-                  </a:outerShdw>
-                </a:effectLst>
-              </a14:hiddenEffects>
-            </a:ext>
-          </a:extLst>
-        </p:spPr>
-      </p:pic>
-      <p:sp>
-        <p:nvSpPr>
-          <p:cNvPr id="2" name="AutoShape 2" descr="Estilo, cesta, ícone, alimento, esboço. Icon., isolado, teia, cesta,  vetorial, ícone, alimento, esboço, fundo, branca, | CanStock"/>
-          <p:cNvSpPr>
-            <a:spLocks noChangeAspect="1" noChangeArrowheads="1"/>
-          </p:cNvSpPr>
-          <p:nvPr/>
-        </p:nvSpPr>
-        <p:spPr bwMode="auto">
-          <a:xfrm>
-            <a:off x="155575" y="-822325"/>
-            <a:ext cx="1876425" cy="1714500"/>
-          </a:xfrm>
-          <a:prstGeom prst="rect">
-            <a:avLst/>
-          </a:prstGeom>
-          <a:noFill/>
-          <a:extLst>
-            <a:ext uri="{909E8E84-426E-40DD-AFC4-6F175D3DCCD1}">
-              <a14:hiddenFill xmlns:a14="http://schemas.microsoft.com/office/drawing/2010/main">
-                <a:solidFill>
-                  <a:srgbClr val="FFFFFF"/>
-                </a:solidFill>
-              </a14:hiddenFill>
-            </a:ext>
-          </a:extLst>
-        </p:spPr>
-        <p:txBody>
-          <a:bodyPr vert="horz" wrap="square" lIns="91440" tIns="45720" rIns="91440" bIns="45720" numCol="1" anchor="t" anchorCtr="0" compatLnSpc="1">
-            <a:prstTxWarp prst="textNoShape">
-              <a:avLst/>
-            </a:prstTxWarp>
-          </a:bodyPr>
-          <a:lstStyle/>
-          <a:p>
-            <a:endParaRPr lang="pt-BR"/>
-          </a:p>
-        </p:txBody>
-      </p:sp>
-      <p:pic>
-        <p:nvPicPr>
-          <p:cNvPr id="2050" name="Picture 2"/>
-          <p:cNvPicPr>
-            <a:picLocks noChangeAspect="1" noChangeArrowheads="1"/>
-          </p:cNvPicPr>
-          <p:nvPr/>
-        </p:nvPicPr>
-        <p:blipFill>
-          <a:blip r:embed="rId4">
-            <a:extLst>
-              <a:ext uri="{28A0092B-C50C-407E-A947-70E740481C1C}">
-                <a14:useLocalDpi xmlns:a14="http://schemas.microsoft.com/office/drawing/2010/main" val="0"/>
-              </a:ext>
-            </a:extLst>
-          </a:blip>
-          <a:srcRect/>
-          <a:stretch>
-            <a:fillRect/>
-          </a:stretch>
-        </p:blipFill>
-        <p:spPr bwMode="auto">
-          <a:xfrm>
-            <a:off x="782306" y="1509214"/>
-            <a:ext cx="869746" cy="869746"/>
-          </a:xfrm>
-          <a:prstGeom prst="rect">
-            <a:avLst/>
-          </a:prstGeom>
-          <a:noFill/>
-          <a:ln>
-            <a:noFill/>
-          </a:ln>
-          <a:effectLst/>
-          <a:extLst>
-            <a:ext uri="{909E8E84-426E-40DD-AFC4-6F175D3DCCD1}">
-              <a14:hiddenFill xmlns:a14="http://schemas.microsoft.com/office/drawing/2010/main">
-                <a:solidFill>
-                  <a:schemeClr val="accent1"/>
-                </a:solidFill>
-              </a14:hiddenFill>
-            </a:ext>
-            <a:ext uri="{91240B29-F687-4F45-9708-019B960494DF}">
-              <a14:hiddenLine xmlns:a14="http://schemas.microsoft.com/office/drawing/2010/main" w="9525">
-                <a:solidFill>
-                  <a:schemeClr val="tx1"/>
-                </a:solidFill>
-                <a:miter lim="800000"/>
-                <a:headEnd/>
-                <a:tailEnd/>
-              </a14:hiddenLine>
-            </a:ext>
-            <a:ext uri="{AF507438-7753-43E0-B8FC-AC1667EBCBE1}">
-              <a14:hiddenEffects xmlns:a14="http://schemas.microsoft.com/office/drawing/2010/main">
-                <a:effectLst>
-                  <a:outerShdw dist="35921" dir="2700000" algn="ctr" rotWithShape="0">
-                    <a:schemeClr val="bg2"/>
-                  </a:outerShdw>
-                </a:effectLst>
-              </a14:hiddenEffects>
-            </a:ext>
-          </a:extLst>
-        </p:spPr>
-      </p:pic>
-      <p:sp>
-        <p:nvSpPr>
-          <p:cNvPr id="28" name="Google Shape;535;p45"/>
-          <p:cNvSpPr txBox="1">
-            <a:spLocks noGrp="1"/>
-          </p:cNvSpPr>
-          <p:nvPr>
-            <p:ph type="subTitle" idx="3"/>
-          </p:nvPr>
-        </p:nvSpPr>
-        <p:spPr>
-          <a:xfrm>
-            <a:off x="1907704" y="2376186"/>
-            <a:ext cx="6408712" cy="2427811"/>
-          </a:xfrm>
-          <a:prstGeom prst="rect">
-            <a:avLst/>
-          </a:prstGeom>
-        </p:spPr>
-        <p:txBody>
-          <a:bodyPr spcFirstLastPara="1" wrap="square" lIns="91425" tIns="91425" rIns="91425" bIns="91425" anchor="t" anchorCtr="0">
-            <a:noAutofit/>
-          </a:bodyPr>
-          <a:lstStyle/>
-          <a:p>
-            <a:r>
-              <a:rPr lang="pt-BR" dirty="0">
-                <a:solidFill>
-                  <a:schemeClr val="bg2"/>
-                </a:solidFill>
-              </a:rPr>
-              <a:t>Validação de número de telefone: É importante validar os números de telefone dos clientes para garantir que eles estejam corretos e possam ser usados para fins de contato.</a:t>
-            </a:r>
-          </a:p>
-          <a:p>
-            <a:r>
-              <a:rPr lang="pt-BR" dirty="0" smtClean="0">
-                <a:solidFill>
-                  <a:schemeClr val="bg2"/>
-                </a:solidFill>
-              </a:rPr>
-              <a:t>Atualização </a:t>
-            </a:r>
-            <a:r>
-              <a:rPr lang="pt-BR" dirty="0">
-                <a:solidFill>
-                  <a:schemeClr val="bg2"/>
-                </a:solidFill>
-              </a:rPr>
-              <a:t>de informações de telefone: É importante permitir que os clientes atualizem suas informações de telefone a qualquer momento, para garantir que sempre haja um meio de contato válido.</a:t>
-            </a:r>
-          </a:p>
-          <a:p>
-            <a:r>
-              <a:rPr lang="pt-BR" dirty="0">
-                <a:solidFill>
-                  <a:schemeClr val="bg2"/>
-                </a:solidFill>
-              </a:rPr>
-              <a:t>Segurança de dados: É importante garantir a segurança dos dados dos telefones dos clientes, incluindo a proteção contra acesso não autorizado e vazamento de informações sensíveis.</a:t>
-            </a:r>
-          </a:p>
-        </p:txBody>
-      </p:sp>
-    </p:spTree>
-    <p:extLst>
-      <p:ext uri="{BB962C8B-B14F-4D97-AF65-F5344CB8AC3E}">
-        <p14:creationId xmlns:p14="http://schemas.microsoft.com/office/powerpoint/2010/main" val="2688087895"/>
-      </p:ext>
-    </p:extLst>
   </p:cSld>
   <p:clrMapOvr>
     <a:masterClrMapping/>

</xml_diff>